<commit_message>
small changes to Week 2 lab
</commit_message>
<xml_diff>
--- a/Week 2 -- mixed-effects/Lab 2/Lab 2 -- Mixed-effects models.pptx
+++ b/Week 2 -- mixed-effects/Lab 2/Lab 2 -- Mixed-effects models.pptx
@@ -5,7 +5,7 @@
     <p:sldMasterId id="2147483672" r:id="rId1"/>
   </p:sldMasterIdLst>
   <p:notesMasterIdLst>
-    <p:notesMasterId r:id="rId26"/>
+    <p:notesMasterId r:id="rId27"/>
   </p:notesMasterIdLst>
   <p:sldIdLst>
     <p:sldId id="266" r:id="rId2"/>
@@ -20,18 +20,19 @@
     <p:sldId id="267" r:id="rId11"/>
     <p:sldId id="273" r:id="rId12"/>
     <p:sldId id="268" r:id="rId13"/>
-    <p:sldId id="269" r:id="rId14"/>
-    <p:sldId id="270" r:id="rId15"/>
-    <p:sldId id="271" r:id="rId16"/>
-    <p:sldId id="274" r:id="rId17"/>
-    <p:sldId id="275" r:id="rId18"/>
-    <p:sldId id="272" r:id="rId19"/>
-    <p:sldId id="279" r:id="rId20"/>
-    <p:sldId id="281" r:id="rId21"/>
-    <p:sldId id="282" r:id="rId22"/>
-    <p:sldId id="283" r:id="rId23"/>
-    <p:sldId id="284" r:id="rId24"/>
-    <p:sldId id="280" r:id="rId25"/>
+    <p:sldId id="290" r:id="rId14"/>
+    <p:sldId id="269" r:id="rId15"/>
+    <p:sldId id="270" r:id="rId16"/>
+    <p:sldId id="271" r:id="rId17"/>
+    <p:sldId id="274" r:id="rId18"/>
+    <p:sldId id="275" r:id="rId19"/>
+    <p:sldId id="272" r:id="rId20"/>
+    <p:sldId id="279" r:id="rId21"/>
+    <p:sldId id="281" r:id="rId22"/>
+    <p:sldId id="282" r:id="rId23"/>
+    <p:sldId id="283" r:id="rId24"/>
+    <p:sldId id="284" r:id="rId25"/>
+    <p:sldId id="280" r:id="rId26"/>
   </p:sldIdLst>
   <p:sldSz cx="9144000" cy="6858000" type="screen4x3"/>
   <p:notesSz cx="6858000" cy="9144000"/>
@@ -220,7 +221,7 @@
           <a:p>
             <a:fld id="{1522831B-4FE3-4D45-950B-0D2C6BB2DD76}" type="datetimeFigureOut">
               <a:rPr lang="en-US" smtClean="0"/>
-              <a:t>4/2/2018</a:t>
+              <a:t>4/5/2018</a:t>
             </a:fld>
             <a:endParaRPr lang="en-US"/>
           </a:p>
@@ -5535,7 +5536,7 @@
           <a:graphicData uri="http://schemas.openxmlformats.org/presentationml/2006/ole">
             <mc:AlternateContent xmlns:mc="http://schemas.openxmlformats.org/markup-compatibility/2006">
               <mc:Choice xmlns:v="urn:schemas-microsoft-com:vml" Requires="v">
-                <p:oleObj spid="_x0000_s1038" name="Equation" r:id="rId4" imgW="914400" imgH="291960" progId="Equation.DSMT4">
+                <p:oleObj spid="_x0000_s1041" name="Equation" r:id="rId4" imgW="914400" imgH="291960" progId="Equation.DSMT4">
                   <p:embed/>
                 </p:oleObj>
               </mc:Choice>
@@ -6109,6 +6110,832 @@
       </p:sp>
       <p:sp>
         <p:nvSpPr>
+          <p:cNvPr id="5" name="Slide Number Placeholder 4"/>
+          <p:cNvSpPr>
+            <a:spLocks noGrp="1"/>
+          </p:cNvSpPr>
+          <p:nvPr>
+            <p:ph type="sldNum" sz="quarter" idx="4294967295"/>
+          </p:nvPr>
+        </p:nvSpPr>
+        <p:spPr>
+          <a:xfrm>
+            <a:off x="6553200" y="6492875"/>
+            <a:ext cx="2133600" cy="365125"/>
+          </a:xfrm>
+        </p:spPr>
+        <p:txBody>
+          <a:bodyPr/>
+          <a:lstStyle/>
+          <a:p>
+            <a:fld id="{E0FF4530-C0A9-489F-AD78-78B1E4B1E710}" type="slidenum">
+              <a:rPr lang="en-US" smtClean="0"/>
+              <a:pPr/>
+              <a:t>13</a:t>
+            </a:fld>
+            <a:endParaRPr lang="en-US" dirty="0"/>
+          </a:p>
+        </p:txBody>
+      </p:sp>
+      <mc:AlternateContent xmlns:mc="http://schemas.openxmlformats.org/markup-compatibility/2006" xmlns:a14="http://schemas.microsoft.com/office/drawing/2010/main">
+        <mc:Choice Requires="a14">
+          <p:sp>
+            <p:nvSpPr>
+              <p:cNvPr id="7" name="Content Placeholder 6"/>
+              <p:cNvSpPr>
+                <a:spLocks noGrp="1"/>
+              </p:cNvSpPr>
+              <p:nvPr>
+                <p:ph idx="1"/>
+              </p:nvPr>
+            </p:nvSpPr>
+            <p:spPr/>
+            <p:txBody>
+              <a:bodyPr/>
+              <a:lstStyle/>
+              <a:p>
+                <a:pPr marL="0" indent="0">
+                  <a:buNone/>
+                </a:pPr>
+                <a:r>
+                  <a:rPr lang="en-US" dirty="0" smtClean="0"/>
+                  <a:t>Example – Hierarchical count samples</a:t>
+                </a:r>
+              </a:p>
+              <a:p>
+                <a:pPr marL="457200" lvl="1" indent="0">
+                  <a:buNone/>
+                </a:pPr>
+                <a14:m>
+                  <m:oMathPara xmlns:m="http://schemas.openxmlformats.org/officeDocument/2006/math">
+                    <m:oMathParaPr>
+                      <m:jc m:val="centerGroup"/>
+                    </m:oMathParaPr>
+                    <m:oMath xmlns:m="http://schemas.openxmlformats.org/officeDocument/2006/math">
+                      <m:r>
+                        <m:rPr>
+                          <m:sty m:val="p"/>
+                        </m:rPr>
+                        <a:rPr lang="en-US" b="0" i="0" smtClean="0">
+                          <a:latin typeface="Cambria Math" panose="02040503050406030204" pitchFamily="18" charset="0"/>
+                        </a:rPr>
+                        <m:t>log</m:t>
+                      </m:r>
+                      <m:r>
+                        <a:rPr lang="en-US" b="0" i="1" smtClean="0">
+                          <a:latin typeface="Cambria Math" panose="02040503050406030204" pitchFamily="18" charset="0"/>
+                        </a:rPr>
+                        <m:t>⁡(</m:t>
+                      </m:r>
+                      <m:sSub>
+                        <m:sSubPr>
+                          <m:ctrlPr>
+                            <a:rPr lang="en-US" b="0" i="1" smtClean="0">
+                              <a:latin typeface="Cambria Math" panose="02040503050406030204" pitchFamily="18" charset="0"/>
+                            </a:rPr>
+                          </m:ctrlPr>
+                        </m:sSubPr>
+                        <m:e>
+                          <m:r>
+                            <a:rPr lang="en-US" b="0" i="1" smtClean="0">
+                              <a:latin typeface="Cambria Math" panose="02040503050406030204" pitchFamily="18" charset="0"/>
+                            </a:rPr>
+                            <m:t>𝑑</m:t>
+                          </m:r>
+                        </m:e>
+                        <m:sub>
+                          <m:r>
+                            <a:rPr lang="en-US" b="0" i="1" smtClean="0">
+                              <a:latin typeface="Cambria Math" panose="02040503050406030204" pitchFamily="18" charset="0"/>
+                            </a:rPr>
+                            <m:t>𝑗</m:t>
+                          </m:r>
+                        </m:sub>
+                      </m:sSub>
+                      <m:r>
+                        <a:rPr lang="en-US" b="0" i="1" smtClean="0">
+                          <a:latin typeface="Cambria Math" panose="02040503050406030204" pitchFamily="18" charset="0"/>
+                        </a:rPr>
+                        <m:t>)~</m:t>
+                      </m:r>
+                      <m:r>
+                        <a:rPr lang="en-US" b="0" i="1" smtClean="0">
+                          <a:latin typeface="Cambria Math" panose="02040503050406030204" pitchFamily="18" charset="0"/>
+                        </a:rPr>
+                        <m:t>𝑁𝑜𝑟𝑚𝑎𝑙</m:t>
+                      </m:r>
+                      <m:r>
+                        <a:rPr lang="en-US" b="0" i="1" smtClean="0">
+                          <a:latin typeface="Cambria Math" panose="02040503050406030204" pitchFamily="18" charset="0"/>
+                        </a:rPr>
+                        <m:t>(</m:t>
+                      </m:r>
+                      <m:sSub>
+                        <m:sSubPr>
+                          <m:ctrlPr>
+                            <a:rPr lang="en-US" b="0" i="1" smtClean="0">
+                              <a:latin typeface="Cambria Math" panose="02040503050406030204" pitchFamily="18" charset="0"/>
+                              <a:ea typeface="Cambria Math" panose="02040503050406030204" pitchFamily="18" charset="0"/>
+                            </a:rPr>
+                          </m:ctrlPr>
+                        </m:sSubPr>
+                        <m:e>
+                          <m:r>
+                            <a:rPr lang="en-US" b="0" i="1" smtClean="0">
+                              <a:latin typeface="Cambria Math" panose="02040503050406030204" pitchFamily="18" charset="0"/>
+                              <a:ea typeface="Cambria Math" panose="02040503050406030204" pitchFamily="18" charset="0"/>
+                            </a:rPr>
+                            <m:t>𝜇</m:t>
+                          </m:r>
+                        </m:e>
+                        <m:sub>
+                          <m:r>
+                            <a:rPr lang="en-US" b="0" i="1" smtClean="0">
+                              <a:latin typeface="Cambria Math" panose="02040503050406030204" pitchFamily="18" charset="0"/>
+                              <a:ea typeface="Cambria Math" panose="02040503050406030204" pitchFamily="18" charset="0"/>
+                            </a:rPr>
+                            <m:t>𝑑</m:t>
+                          </m:r>
+                        </m:sub>
+                      </m:sSub>
+                      <m:r>
+                        <a:rPr lang="en-US" b="0" i="1" smtClean="0">
+                          <a:latin typeface="Cambria Math" panose="02040503050406030204" pitchFamily="18" charset="0"/>
+                          <a:ea typeface="Cambria Math" panose="02040503050406030204" pitchFamily="18" charset="0"/>
+                        </a:rPr>
+                        <m:t>,</m:t>
+                      </m:r>
+                      <m:sSubSup>
+                        <m:sSubSupPr>
+                          <m:ctrlPr>
+                            <a:rPr lang="en-US" b="0" i="1" smtClean="0">
+                              <a:latin typeface="Cambria Math" panose="02040503050406030204" pitchFamily="18" charset="0"/>
+                              <a:ea typeface="Cambria Math" panose="02040503050406030204" pitchFamily="18" charset="0"/>
+                            </a:rPr>
+                          </m:ctrlPr>
+                        </m:sSubSupPr>
+                        <m:e>
+                          <m:r>
+                            <a:rPr lang="en-US" b="0" i="1" smtClean="0">
+                              <a:latin typeface="Cambria Math" panose="02040503050406030204" pitchFamily="18" charset="0"/>
+                              <a:ea typeface="Cambria Math" panose="02040503050406030204" pitchFamily="18" charset="0"/>
+                            </a:rPr>
+                            <m:t>𝜎</m:t>
+                          </m:r>
+                        </m:e>
+                        <m:sub>
+                          <m:r>
+                            <a:rPr lang="en-US" b="0" i="1" smtClean="0">
+                              <a:latin typeface="Cambria Math" panose="02040503050406030204" pitchFamily="18" charset="0"/>
+                              <a:ea typeface="Cambria Math" panose="02040503050406030204" pitchFamily="18" charset="0"/>
+                            </a:rPr>
+                            <m:t>𝑑</m:t>
+                          </m:r>
+                        </m:sub>
+                        <m:sup>
+                          <m:r>
+                            <a:rPr lang="en-US" b="0" i="1" smtClean="0">
+                              <a:latin typeface="Cambria Math" panose="02040503050406030204" pitchFamily="18" charset="0"/>
+                              <a:ea typeface="Cambria Math" panose="02040503050406030204" pitchFamily="18" charset="0"/>
+                            </a:rPr>
+                            <m:t>2</m:t>
+                          </m:r>
+                        </m:sup>
+                      </m:sSubSup>
+                      <m:r>
+                        <a:rPr lang="en-US" b="0" i="1" smtClean="0">
+                          <a:latin typeface="Cambria Math" panose="02040503050406030204" pitchFamily="18" charset="0"/>
+                          <a:ea typeface="Cambria Math" panose="02040503050406030204" pitchFamily="18" charset="0"/>
+                        </a:rPr>
+                        <m:t>)</m:t>
+                      </m:r>
+                    </m:oMath>
+                  </m:oMathPara>
+                </a14:m>
+                <a:endParaRPr lang="en-US" dirty="0" smtClean="0"/>
+              </a:p>
+              <a:p>
+                <a:pPr marL="457200" lvl="1" indent="0">
+                  <a:buNone/>
+                </a:pPr>
+                <a14:m>
+                  <m:oMathPara xmlns:m="http://schemas.openxmlformats.org/officeDocument/2006/math">
+                    <m:oMathParaPr>
+                      <m:jc m:val="centerGroup"/>
+                    </m:oMathParaPr>
+                    <m:oMath xmlns:m="http://schemas.openxmlformats.org/officeDocument/2006/math">
+                      <m:sSub>
+                        <m:sSubPr>
+                          <m:ctrlPr>
+                            <a:rPr lang="en-US" b="0" i="1" smtClean="0">
+                              <a:latin typeface="Cambria Math" panose="02040503050406030204" pitchFamily="18" charset="0"/>
+                            </a:rPr>
+                          </m:ctrlPr>
+                        </m:sSubPr>
+                        <m:e>
+                          <m:r>
+                            <a:rPr lang="en-US" b="0" i="1" smtClean="0">
+                              <a:latin typeface="Cambria Math" panose="02040503050406030204" pitchFamily="18" charset="0"/>
+                            </a:rPr>
+                            <m:t>𝑐</m:t>
+                          </m:r>
+                        </m:e>
+                        <m:sub>
+                          <m:r>
+                            <a:rPr lang="en-US" b="0" i="1" smtClean="0">
+                              <a:latin typeface="Cambria Math" panose="02040503050406030204" pitchFamily="18" charset="0"/>
+                            </a:rPr>
+                            <m:t>𝑖</m:t>
+                          </m:r>
+                          <m:r>
+                            <a:rPr lang="en-US" b="0" i="1" smtClean="0">
+                              <a:latin typeface="Cambria Math" panose="02040503050406030204" pitchFamily="18" charset="0"/>
+                            </a:rPr>
+                            <m:t>,</m:t>
+                          </m:r>
+                          <m:r>
+                            <a:rPr lang="en-US" b="0" i="1" smtClean="0">
+                              <a:latin typeface="Cambria Math" panose="02040503050406030204" pitchFamily="18" charset="0"/>
+                            </a:rPr>
+                            <m:t>𝑗</m:t>
+                          </m:r>
+                        </m:sub>
+                      </m:sSub>
+                      <m:r>
+                        <a:rPr lang="en-US" b="0" i="1" smtClean="0">
+                          <a:latin typeface="Cambria Math" panose="02040503050406030204" pitchFamily="18" charset="0"/>
+                        </a:rPr>
+                        <m:t>~</m:t>
+                      </m:r>
+                      <m:r>
+                        <a:rPr lang="en-US" b="0" i="1" smtClean="0">
+                          <a:latin typeface="Cambria Math" panose="02040503050406030204" pitchFamily="18" charset="0"/>
+                        </a:rPr>
+                        <m:t>𝑃𝑜𝑖𝑠𝑠𝑜𝑛</m:t>
+                      </m:r>
+                      <m:r>
+                        <a:rPr lang="en-US" b="0" i="1" smtClean="0">
+                          <a:latin typeface="Cambria Math" panose="02040503050406030204" pitchFamily="18" charset="0"/>
+                        </a:rPr>
+                        <m:t>(</m:t>
+                      </m:r>
+                      <m:sSub>
+                        <m:sSubPr>
+                          <m:ctrlPr>
+                            <a:rPr lang="en-US" i="1">
+                              <a:latin typeface="Cambria Math" panose="02040503050406030204" pitchFamily="18" charset="0"/>
+                            </a:rPr>
+                          </m:ctrlPr>
+                        </m:sSubPr>
+                        <m:e>
+                          <m:r>
+                            <a:rPr lang="en-US" i="1">
+                              <a:latin typeface="Cambria Math" panose="02040503050406030204" pitchFamily="18" charset="0"/>
+                            </a:rPr>
+                            <m:t>𝑑</m:t>
+                          </m:r>
+                        </m:e>
+                        <m:sub>
+                          <m:r>
+                            <a:rPr lang="en-US" i="1">
+                              <a:latin typeface="Cambria Math" panose="02040503050406030204" pitchFamily="18" charset="0"/>
+                            </a:rPr>
+                            <m:t>𝑗</m:t>
+                          </m:r>
+                        </m:sub>
+                      </m:sSub>
+                      <m:r>
+                        <a:rPr lang="en-US" b="0" i="1" smtClean="0">
+                          <a:latin typeface="Cambria Math" panose="02040503050406030204" pitchFamily="18" charset="0"/>
+                        </a:rPr>
+                        <m:t>)</m:t>
+                      </m:r>
+                    </m:oMath>
+                  </m:oMathPara>
+                </a14:m>
+                <a:endParaRPr lang="en-US" dirty="0"/>
+              </a:p>
+              <a:p>
+                <a:pPr lvl="1"/>
+                <a:endParaRPr lang="en-US" dirty="0"/>
+              </a:p>
+              <a:p>
+                <a:pPr marL="57150" indent="0">
+                  <a:buNone/>
+                </a:pPr>
+                <a:r>
+                  <a:rPr lang="en-US" dirty="0" smtClean="0"/>
+                  <a:t>Questions:</a:t>
+                </a:r>
+              </a:p>
+              <a:p>
+                <a:pPr marL="571500" indent="-514350">
+                  <a:buFont typeface="+mj-lt"/>
+                  <a:buAutoNum type="arabicPeriod"/>
+                </a:pPr>
+                <a:r>
+                  <a:rPr lang="en-US" dirty="0" smtClean="0"/>
+                  <a:t>What is the mean of </a:t>
+                </a:r>
+                <a14:m>
+                  <m:oMath xmlns:m="http://schemas.openxmlformats.org/officeDocument/2006/math">
+                    <m:sSub>
+                      <m:sSubPr>
+                        <m:ctrlPr>
+                          <a:rPr lang="en-US" i="1">
+                            <a:latin typeface="Cambria Math" panose="02040503050406030204" pitchFamily="18" charset="0"/>
+                          </a:rPr>
+                        </m:ctrlPr>
+                      </m:sSubPr>
+                      <m:e>
+                        <m:r>
+                          <a:rPr lang="en-US" i="1">
+                            <a:latin typeface="Cambria Math" panose="02040503050406030204" pitchFamily="18" charset="0"/>
+                          </a:rPr>
+                          <m:t>𝑑</m:t>
+                        </m:r>
+                      </m:e>
+                      <m:sub>
+                        <m:r>
+                          <a:rPr lang="en-US" i="1">
+                            <a:latin typeface="Cambria Math" panose="02040503050406030204" pitchFamily="18" charset="0"/>
+                          </a:rPr>
+                          <m:t>𝑗</m:t>
+                        </m:r>
+                      </m:sub>
+                    </m:sSub>
+                  </m:oMath>
+                </a14:m>
+                <a:r>
+                  <a:rPr lang="en-US" dirty="0" smtClean="0"/>
+                  <a:t> across all sites </a:t>
+                </a:r>
+                <a14:m>
+                  <m:oMath xmlns:m="http://schemas.openxmlformats.org/officeDocument/2006/math">
+                    <m:r>
+                      <a:rPr lang="en-US" b="0" i="1" smtClean="0">
+                        <a:latin typeface="Cambria Math" panose="02040503050406030204" pitchFamily="18" charset="0"/>
+                      </a:rPr>
+                      <m:t>𝑗</m:t>
+                    </m:r>
+                  </m:oMath>
+                </a14:m>
+                <a:r>
+                  <a:rPr lang="en-US" dirty="0" smtClean="0"/>
+                  <a:t>?</a:t>
+                </a:r>
+              </a:p>
+              <a:p>
+                <a:pPr marL="571500" indent="-514350">
+                  <a:buFont typeface="+mj-lt"/>
+                  <a:buAutoNum type="arabicPeriod"/>
+                </a:pPr>
+                <a:r>
+                  <a:rPr lang="en-US" dirty="0" smtClean="0"/>
+                  <a:t>What is the variance of </a:t>
+                </a:r>
+                <a14:m>
+                  <m:oMath xmlns:m="http://schemas.openxmlformats.org/officeDocument/2006/math">
+                    <m:sSub>
+                      <m:sSubPr>
+                        <m:ctrlPr>
+                          <a:rPr lang="en-US" b="0" i="1" smtClean="0">
+                            <a:latin typeface="Cambria Math" panose="02040503050406030204" pitchFamily="18" charset="0"/>
+                          </a:rPr>
+                        </m:ctrlPr>
+                      </m:sSubPr>
+                      <m:e>
+                        <m:r>
+                          <a:rPr lang="en-US" b="0" i="1" smtClean="0">
+                            <a:latin typeface="Cambria Math" panose="02040503050406030204" pitchFamily="18" charset="0"/>
+                          </a:rPr>
+                          <m:t>𝑑</m:t>
+                        </m:r>
+                      </m:e>
+                      <m:sub>
+                        <m:r>
+                          <a:rPr lang="en-US" b="0" i="1" smtClean="0">
+                            <a:latin typeface="Cambria Math" panose="02040503050406030204" pitchFamily="18" charset="0"/>
+                          </a:rPr>
+                          <m:t>𝑗</m:t>
+                        </m:r>
+                      </m:sub>
+                    </m:sSub>
+                  </m:oMath>
+                </a14:m>
+                <a:r>
+                  <a:rPr lang="en-US" dirty="0" smtClean="0"/>
+                  <a:t> across all sites?</a:t>
+                </a:r>
+              </a:p>
+              <a:p>
+                <a:pPr marL="571500" indent="-514350">
+                  <a:buFont typeface="+mj-lt"/>
+                  <a:buAutoNum type="arabicPeriod"/>
+                </a:pPr>
+                <a:r>
+                  <a:rPr lang="en-US" dirty="0" smtClean="0"/>
+                  <a:t>What is the mean of </a:t>
+                </a:r>
+                <a14:m>
+                  <m:oMath xmlns:m="http://schemas.openxmlformats.org/officeDocument/2006/math">
+                    <m:sSub>
+                      <m:sSubPr>
+                        <m:ctrlPr>
+                          <a:rPr lang="en-US" b="0" i="1" smtClean="0">
+                            <a:latin typeface="Cambria Math" panose="02040503050406030204" pitchFamily="18" charset="0"/>
+                          </a:rPr>
+                        </m:ctrlPr>
+                      </m:sSubPr>
+                      <m:e>
+                        <m:r>
+                          <a:rPr lang="en-US" b="0" i="1" smtClean="0">
+                            <a:latin typeface="Cambria Math" panose="02040503050406030204" pitchFamily="18" charset="0"/>
+                          </a:rPr>
+                          <m:t>𝑐</m:t>
+                        </m:r>
+                      </m:e>
+                      <m:sub>
+                        <m:r>
+                          <a:rPr lang="en-US" b="0" i="1" smtClean="0">
+                            <a:latin typeface="Cambria Math" panose="02040503050406030204" pitchFamily="18" charset="0"/>
+                          </a:rPr>
+                          <m:t>𝑖</m:t>
+                        </m:r>
+                        <m:r>
+                          <a:rPr lang="en-US" b="0" i="1" smtClean="0">
+                            <a:latin typeface="Cambria Math" panose="02040503050406030204" pitchFamily="18" charset="0"/>
+                          </a:rPr>
+                          <m:t>,</m:t>
+                        </m:r>
+                        <m:r>
+                          <a:rPr lang="en-US" b="0" i="1" smtClean="0">
+                            <a:latin typeface="Cambria Math" panose="02040503050406030204" pitchFamily="18" charset="0"/>
+                          </a:rPr>
+                          <m:t>𝑗</m:t>
+                        </m:r>
+                      </m:sub>
+                    </m:sSub>
+                  </m:oMath>
+                </a14:m>
+                <a:r>
+                  <a:rPr lang="en-US" dirty="0"/>
+                  <a:t> across all sites </a:t>
+                </a:r>
+                <a14:m>
+                  <m:oMath xmlns:m="http://schemas.openxmlformats.org/officeDocument/2006/math">
+                    <m:r>
+                      <a:rPr lang="en-US" i="1">
+                        <a:latin typeface="Cambria Math" panose="02040503050406030204" pitchFamily="18" charset="0"/>
+                      </a:rPr>
+                      <m:t>𝑗</m:t>
+                    </m:r>
+                  </m:oMath>
+                </a14:m>
+                <a:r>
+                  <a:rPr lang="en-US" dirty="0"/>
+                  <a:t> and samples </a:t>
+                </a:r>
+                <a14:m>
+                  <m:oMath xmlns:m="http://schemas.openxmlformats.org/officeDocument/2006/math">
+                    <m:r>
+                      <a:rPr lang="en-US" i="1">
+                        <a:latin typeface="Cambria Math" panose="02040503050406030204" pitchFamily="18" charset="0"/>
+                      </a:rPr>
+                      <m:t>𝑖</m:t>
+                    </m:r>
+                  </m:oMath>
+                </a14:m>
+                <a:r>
+                  <a:rPr lang="en-US" dirty="0"/>
+                  <a:t>?</a:t>
+                </a:r>
+                <a:endParaRPr lang="en-US" dirty="0" smtClean="0"/>
+              </a:p>
+              <a:p>
+                <a:pPr marL="571500" indent="-514350">
+                  <a:buFont typeface="+mj-lt"/>
+                  <a:buAutoNum type="arabicPeriod"/>
+                </a:pPr>
+                <a:r>
+                  <a:rPr lang="en-US" dirty="0" smtClean="0"/>
+                  <a:t>What is the variance of </a:t>
+                </a:r>
+                <a14:m>
+                  <m:oMath xmlns:m="http://schemas.openxmlformats.org/officeDocument/2006/math">
+                    <m:sSub>
+                      <m:sSubPr>
+                        <m:ctrlPr>
+                          <a:rPr lang="en-US" b="0" i="1" smtClean="0">
+                            <a:latin typeface="Cambria Math" panose="02040503050406030204" pitchFamily="18" charset="0"/>
+                          </a:rPr>
+                        </m:ctrlPr>
+                      </m:sSubPr>
+                      <m:e>
+                        <m:r>
+                          <a:rPr lang="en-US" b="0" i="1" smtClean="0">
+                            <a:latin typeface="Cambria Math" panose="02040503050406030204" pitchFamily="18" charset="0"/>
+                          </a:rPr>
+                          <m:t>𝑐</m:t>
+                        </m:r>
+                      </m:e>
+                      <m:sub>
+                        <m:r>
+                          <a:rPr lang="en-US" b="0" i="1" smtClean="0">
+                            <a:latin typeface="Cambria Math" panose="02040503050406030204" pitchFamily="18" charset="0"/>
+                          </a:rPr>
+                          <m:t>𝑖</m:t>
+                        </m:r>
+                        <m:r>
+                          <a:rPr lang="en-US" b="0" i="1" smtClean="0">
+                            <a:latin typeface="Cambria Math" panose="02040503050406030204" pitchFamily="18" charset="0"/>
+                          </a:rPr>
+                          <m:t>,</m:t>
+                        </m:r>
+                        <m:r>
+                          <a:rPr lang="en-US" b="0" i="1" smtClean="0">
+                            <a:latin typeface="Cambria Math" panose="02040503050406030204" pitchFamily="18" charset="0"/>
+                          </a:rPr>
+                          <m:t>𝑗</m:t>
+                        </m:r>
+                      </m:sub>
+                    </m:sSub>
+                  </m:oMath>
+                </a14:m>
+                <a:r>
+                  <a:rPr lang="en-US" dirty="0" smtClean="0"/>
+                  <a:t> across all sites and samples?</a:t>
+                </a:r>
+                <a:endParaRPr lang="en-US" dirty="0"/>
+              </a:p>
+            </p:txBody>
+          </p:sp>
+        </mc:Choice>
+        <mc:Fallback xmlns="">
+          <p:sp>
+            <p:nvSpPr>
+              <p:cNvPr id="7" name="Content Placeholder 6"/>
+              <p:cNvSpPr>
+                <a:spLocks noGrp="1" noRot="1" noChangeAspect="1" noMove="1" noResize="1" noEditPoints="1" noAdjustHandles="1" noChangeArrowheads="1" noChangeShapeType="1" noTextEdit="1"/>
+              </p:cNvSpPr>
+              <p:nvPr>
+                <p:ph idx="1"/>
+              </p:nvPr>
+            </p:nvSpPr>
+            <p:spPr>
+              <a:blipFill>
+                <a:blip r:embed="rId2"/>
+                <a:stretch>
+                  <a:fillRect l="-1424" t="-1026"/>
+                </a:stretch>
+              </a:blipFill>
+            </p:spPr>
+            <p:txBody>
+              <a:bodyPr/>
+              <a:lstStyle/>
+              <a:p>
+                <a:r>
+                  <a:rPr lang="en-GB">
+                    <a:noFill/>
+                  </a:rPr>
+                  <a:t> </a:t>
+                </a:r>
+              </a:p>
+            </p:txBody>
+          </p:sp>
+        </mc:Fallback>
+      </mc:AlternateContent>
+    </p:spTree>
+    <p:extLst>
+      <p:ext uri="{BB962C8B-B14F-4D97-AF65-F5344CB8AC3E}">
+        <p14:creationId xmlns:p14="http://schemas.microsoft.com/office/powerpoint/2010/main" val="2388202130"/>
+      </p:ext>
+    </p:extLst>
+  </p:cSld>
+  <p:clrMapOvr>
+    <a:masterClrMapping/>
+  </p:clrMapOvr>
+  <p:timing>
+    <p:tnLst>
+      <p:par>
+        <p:cTn id="1" dur="indefinite" restart="never" nodeType="tmRoot">
+          <p:childTnLst>
+            <p:seq concurrent="1" nextAc="seek">
+              <p:cTn id="2" dur="indefinite" nodeType="mainSeq">
+                <p:childTnLst>
+                  <p:par>
+                    <p:cTn id="3" fill="hold">
+                      <p:stCondLst>
+                        <p:cond delay="indefinite"/>
+                      </p:stCondLst>
+                      <p:childTnLst>
+                        <p:par>
+                          <p:cTn id="4" fill="hold">
+                            <p:stCondLst>
+                              <p:cond delay="0"/>
+                            </p:stCondLst>
+                            <p:childTnLst>
+                              <p:par>
+                                <p:cTn id="5" presetID="1" presetClass="entr" presetSubtype="0" fill="hold" nodeType="clickEffect">
+                                  <p:stCondLst>
+                                    <p:cond delay="0"/>
+                                  </p:stCondLst>
+                                  <p:childTnLst>
+                                    <p:set>
+                                      <p:cBhvr>
+                                        <p:cTn id="6" dur="1" fill="hold">
+                                          <p:stCondLst>
+                                            <p:cond delay="0"/>
+                                          </p:stCondLst>
+                                        </p:cTn>
+                                        <p:tgtEl>
+                                          <p:spTgt spid="7">
+                                            <p:txEl>
+                                              <p:pRg st="6" end="6"/>
+                                            </p:txEl>
+                                          </p:spTgt>
+                                        </p:tgtEl>
+                                        <p:attrNameLst>
+                                          <p:attrName>style.visibility</p:attrName>
+                                        </p:attrNameLst>
+                                      </p:cBhvr>
+                                      <p:to>
+                                        <p:strVal val="visible"/>
+                                      </p:to>
+                                    </p:set>
+                                  </p:childTnLst>
+                                </p:cTn>
+                              </p:par>
+                            </p:childTnLst>
+                          </p:cTn>
+                        </p:par>
+                      </p:childTnLst>
+                    </p:cTn>
+                  </p:par>
+                  <p:par>
+                    <p:cTn id="7" fill="hold">
+                      <p:stCondLst>
+                        <p:cond delay="indefinite"/>
+                      </p:stCondLst>
+                      <p:childTnLst>
+                        <p:par>
+                          <p:cTn id="8" fill="hold">
+                            <p:stCondLst>
+                              <p:cond delay="0"/>
+                            </p:stCondLst>
+                            <p:childTnLst>
+                              <p:par>
+                                <p:cTn id="9" presetID="1" presetClass="entr" presetSubtype="0" fill="hold" nodeType="clickEffect">
+                                  <p:stCondLst>
+                                    <p:cond delay="0"/>
+                                  </p:stCondLst>
+                                  <p:childTnLst>
+                                    <p:set>
+                                      <p:cBhvr>
+                                        <p:cTn id="10" dur="1" fill="hold">
+                                          <p:stCondLst>
+                                            <p:cond delay="0"/>
+                                          </p:stCondLst>
+                                        </p:cTn>
+                                        <p:tgtEl>
+                                          <p:spTgt spid="7">
+                                            <p:txEl>
+                                              <p:pRg st="7" end="7"/>
+                                            </p:txEl>
+                                          </p:spTgt>
+                                        </p:tgtEl>
+                                        <p:attrNameLst>
+                                          <p:attrName>style.visibility</p:attrName>
+                                        </p:attrNameLst>
+                                      </p:cBhvr>
+                                      <p:to>
+                                        <p:strVal val="visible"/>
+                                      </p:to>
+                                    </p:set>
+                                  </p:childTnLst>
+                                </p:cTn>
+                              </p:par>
+                            </p:childTnLst>
+                          </p:cTn>
+                        </p:par>
+                      </p:childTnLst>
+                    </p:cTn>
+                  </p:par>
+                  <p:par>
+                    <p:cTn id="11" fill="hold">
+                      <p:stCondLst>
+                        <p:cond delay="indefinite"/>
+                      </p:stCondLst>
+                      <p:childTnLst>
+                        <p:par>
+                          <p:cTn id="12" fill="hold">
+                            <p:stCondLst>
+                              <p:cond delay="0"/>
+                            </p:stCondLst>
+                            <p:childTnLst>
+                              <p:par>
+                                <p:cTn id="13" presetID="1" presetClass="entr" presetSubtype="0" fill="hold" nodeType="clickEffect">
+                                  <p:stCondLst>
+                                    <p:cond delay="0"/>
+                                  </p:stCondLst>
+                                  <p:childTnLst>
+                                    <p:set>
+                                      <p:cBhvr>
+                                        <p:cTn id="14" dur="1" fill="hold">
+                                          <p:stCondLst>
+                                            <p:cond delay="0"/>
+                                          </p:stCondLst>
+                                        </p:cTn>
+                                        <p:tgtEl>
+                                          <p:spTgt spid="7">
+                                            <p:txEl>
+                                              <p:pRg st="8" end="8"/>
+                                            </p:txEl>
+                                          </p:spTgt>
+                                        </p:tgtEl>
+                                        <p:attrNameLst>
+                                          <p:attrName>style.visibility</p:attrName>
+                                        </p:attrNameLst>
+                                      </p:cBhvr>
+                                      <p:to>
+                                        <p:strVal val="visible"/>
+                                      </p:to>
+                                    </p:set>
+                                  </p:childTnLst>
+                                </p:cTn>
+                              </p:par>
+                            </p:childTnLst>
+                          </p:cTn>
+                        </p:par>
+                      </p:childTnLst>
+                    </p:cTn>
+                  </p:par>
+                </p:childTnLst>
+              </p:cTn>
+              <p:prevCondLst>
+                <p:cond evt="onPrev" delay="0">
+                  <p:tgtEl>
+                    <p:sldTgt/>
+                  </p:tgtEl>
+                </p:cond>
+              </p:prevCondLst>
+              <p:nextCondLst>
+                <p:cond evt="onNext" delay="0">
+                  <p:tgtEl>
+                    <p:sldTgt/>
+                  </p:tgtEl>
+                </p:cond>
+              </p:nextCondLst>
+            </p:seq>
+          </p:childTnLst>
+        </p:cTn>
+      </p:par>
+    </p:tnLst>
+  </p:timing>
+</p:sld>
+</file>
+
+<file path=ppt/slides/slide14.xml><?xml version="1.0" encoding="utf-8"?>
+<p:sld xmlns:a="http://schemas.openxmlformats.org/drawingml/2006/main" xmlns:r="http://schemas.openxmlformats.org/officeDocument/2006/relationships" xmlns:p="http://schemas.openxmlformats.org/presentationml/2006/main">
+  <p:cSld>
+    <p:spTree>
+      <p:nvGrpSpPr>
+        <p:cNvPr id="1" name=""/>
+        <p:cNvGrpSpPr/>
+        <p:nvPr/>
+      </p:nvGrpSpPr>
+      <p:grpSpPr>
+        <a:xfrm>
+          <a:off x="0" y="0"/>
+          <a:ext cx="0" cy="0"/>
+          <a:chOff x="0" y="0"/>
+          <a:chExt cx="0" cy="0"/>
+        </a:xfrm>
+      </p:grpSpPr>
+      <p:sp>
+        <p:nvSpPr>
+          <p:cNvPr id="2" name="Title 1"/>
+          <p:cNvSpPr>
+            <a:spLocks noGrp="1"/>
+          </p:cNvSpPr>
+          <p:nvPr>
+            <p:ph type="title"/>
+          </p:nvPr>
+        </p:nvSpPr>
+        <p:spPr/>
+        <p:txBody>
+          <a:bodyPr/>
+          <a:lstStyle/>
+          <a:p>
+            <a:r>
+              <a:rPr lang="en-US" dirty="0"/>
+              <a:t>Mixed-effects models</a:t>
+            </a:r>
+          </a:p>
+        </p:txBody>
+      </p:sp>
+      <p:sp>
+        <p:nvSpPr>
           <p:cNvPr id="3" name="Content Placeholder 2"/>
           <p:cNvSpPr>
             <a:spLocks noGrp="1"/>
@@ -6163,7 +6990,7 @@
 </p:sld>
 </file>
 
-<file path=ppt/slides/slide14.xml><?xml version="1.0" encoding="utf-8"?>
+<file path=ppt/slides/slide15.xml><?xml version="1.0" encoding="utf-8"?>
 <p:sld xmlns:a="http://schemas.openxmlformats.org/drawingml/2006/main" xmlns:r="http://schemas.openxmlformats.org/officeDocument/2006/relationships" xmlns:p="http://schemas.openxmlformats.org/presentationml/2006/main">
   <p:cSld>
     <p:spTree>
@@ -6353,7 +7180,7 @@
 </p:sld>
 </file>
 
-<file path=ppt/slides/slide15.xml><?xml version="1.0" encoding="utf-8"?>
+<file path=ppt/slides/slide16.xml><?xml version="1.0" encoding="utf-8"?>
 <p:sld xmlns:a="http://schemas.openxmlformats.org/drawingml/2006/main" xmlns:r="http://schemas.openxmlformats.org/officeDocument/2006/relationships" xmlns:p="http://schemas.openxmlformats.org/presentationml/2006/main">
   <p:cSld>
     <p:spTree>
@@ -6446,7 +7273,7 @@
 </p:sld>
 </file>
 
-<file path=ppt/slides/slide16.xml><?xml version="1.0" encoding="utf-8"?>
+<file path=ppt/slides/slide17.xml><?xml version="1.0" encoding="utf-8"?>
 <p:sld xmlns:a="http://schemas.openxmlformats.org/drawingml/2006/main" xmlns:r="http://schemas.openxmlformats.org/officeDocument/2006/relationships" xmlns:p="http://schemas.openxmlformats.org/presentationml/2006/main">
   <p:cSld>
     <p:spTree>
@@ -7497,10 +8324,17 @@
   <p:clrMapOvr>
     <a:masterClrMapping/>
   </p:clrMapOvr>
+  <p:timing>
+    <p:tnLst>
+      <p:par>
+        <p:cTn id="1" dur="indefinite" restart="never" nodeType="tmRoot"/>
+      </p:par>
+    </p:tnLst>
+  </p:timing>
 </p:sld>
 </file>
 
-<file path=ppt/slides/slide17.xml><?xml version="1.0" encoding="utf-8"?>
+<file path=ppt/slides/slide18.xml><?xml version="1.0" encoding="utf-8"?>
 <p:sld xmlns:a="http://schemas.openxmlformats.org/drawingml/2006/main" xmlns:r="http://schemas.openxmlformats.org/officeDocument/2006/relationships" xmlns:p="http://schemas.openxmlformats.org/presentationml/2006/main">
   <p:cSld>
     <p:spTree>
@@ -7586,10 +8420,17 @@
   <p:clrMapOvr>
     <a:masterClrMapping/>
   </p:clrMapOvr>
+  <p:timing>
+    <p:tnLst>
+      <p:par>
+        <p:cTn id="1" dur="indefinite" restart="never" nodeType="tmRoot"/>
+      </p:par>
+    </p:tnLst>
+  </p:timing>
 </p:sld>
 </file>
 
-<file path=ppt/slides/slide18.xml><?xml version="1.0" encoding="utf-8"?>
+<file path=ppt/slides/slide19.xml><?xml version="1.0" encoding="utf-8"?>
 <p:sld xmlns:a="http://schemas.openxmlformats.org/drawingml/2006/main" xmlns:r="http://schemas.openxmlformats.org/officeDocument/2006/relationships" xmlns:p="http://schemas.openxmlformats.org/presentationml/2006/main">
   <p:cSld>
     <p:spTree>
@@ -7719,7 +8560,477 @@
 </p:sld>
 </file>
 
-<file path=ppt/slides/slide19.xml><?xml version="1.0" encoding="utf-8"?>
+<file path=ppt/slides/slide2.xml><?xml version="1.0" encoding="utf-8"?>
+<p:sld xmlns:a="http://schemas.openxmlformats.org/drawingml/2006/main" xmlns:r="http://schemas.openxmlformats.org/officeDocument/2006/relationships" xmlns:p="http://schemas.openxmlformats.org/presentationml/2006/main">
+  <p:cSld>
+    <p:spTree>
+      <p:nvGrpSpPr>
+        <p:cNvPr id="1" name=""/>
+        <p:cNvGrpSpPr/>
+        <p:nvPr/>
+      </p:nvGrpSpPr>
+      <p:grpSpPr>
+        <a:xfrm>
+          <a:off x="0" y="0"/>
+          <a:ext cx="0" cy="0"/>
+          <a:chOff x="0" y="0"/>
+          <a:chExt cx="0" cy="0"/>
+        </a:xfrm>
+      </p:grpSpPr>
+      <p:sp>
+        <p:nvSpPr>
+          <p:cNvPr id="2" name="Title 1"/>
+          <p:cNvSpPr>
+            <a:spLocks noGrp="1"/>
+          </p:cNvSpPr>
+          <p:nvPr>
+            <p:ph type="title"/>
+          </p:nvPr>
+        </p:nvSpPr>
+        <p:spPr/>
+        <p:txBody>
+          <a:bodyPr/>
+          <a:lstStyle/>
+          <a:p>
+            <a:r>
+              <a:rPr lang="en-US" dirty="0" smtClean="0"/>
+              <a:t>Mixed-effects models</a:t>
+            </a:r>
+            <a:endParaRPr lang="en-US" dirty="0"/>
+          </a:p>
+        </p:txBody>
+      </p:sp>
+      <mc:AlternateContent xmlns:mc="http://schemas.openxmlformats.org/markup-compatibility/2006" xmlns:a14="http://schemas.microsoft.com/office/drawing/2010/main">
+        <mc:Choice Requires="a14">
+          <p:sp>
+            <p:nvSpPr>
+              <p:cNvPr id="3" name="Content Placeholder 2"/>
+              <p:cNvSpPr>
+                <a:spLocks noGrp="1"/>
+              </p:cNvSpPr>
+              <p:nvPr>
+                <p:ph idx="1"/>
+              </p:nvPr>
+            </p:nvSpPr>
+            <p:spPr/>
+            <p:txBody>
+              <a:bodyPr>
+                <a:normAutofit/>
+              </a:bodyPr>
+              <a:lstStyle/>
+              <a:p>
+                <a:pPr marL="0" indent="0">
+                  <a:buNone/>
+                </a:pPr>
+                <a:r>
+                  <a:rPr lang="en-US" sz="3200" b="1" dirty="0" smtClean="0"/>
+                  <a:t>Laws of probability</a:t>
+                </a:r>
+              </a:p>
+              <a:p>
+                <a:pPr marL="514350" indent="-514350">
+                  <a:buFont typeface="+mj-lt"/>
+                  <a:buAutoNum type="arabicPeriod"/>
+                </a:pPr>
+                <a:r>
+                  <a:rPr lang="en-US" dirty="0" smtClean="0"/>
+                  <a:t>Axiom of conditional probability</a:t>
+                </a:r>
+              </a:p>
+              <a:p>
+                <a:pPr marL="400050" lvl="1" indent="0">
+                  <a:buNone/>
+                </a:pPr>
+                <a14:m>
+                  <m:oMathPara xmlns:m="http://schemas.openxmlformats.org/officeDocument/2006/math">
+                    <m:oMathParaPr>
+                      <m:jc m:val="centerGroup"/>
+                    </m:oMathParaPr>
+                    <m:oMath xmlns:m="http://schemas.openxmlformats.org/officeDocument/2006/math">
+                      <m:func>
+                        <m:funcPr>
+                          <m:ctrlPr>
+                            <a:rPr lang="en-US" i="1">
+                              <a:latin typeface="Cambria Math" panose="02040503050406030204" pitchFamily="18" charset="0"/>
+                            </a:rPr>
+                          </m:ctrlPr>
+                        </m:funcPr>
+                        <m:fName>
+                          <m:r>
+                            <m:rPr>
+                              <m:sty m:val="p"/>
+                            </m:rPr>
+                            <a:rPr lang="en-US">
+                              <a:latin typeface="Cambria Math" panose="02040503050406030204" pitchFamily="18" charset="0"/>
+                            </a:rPr>
+                            <m:t>Pr</m:t>
+                          </m:r>
+                        </m:fName>
+                        <m:e>
+                          <m:d>
+                            <m:dPr>
+                              <m:ctrlPr>
+                                <a:rPr lang="en-US" i="1">
+                                  <a:latin typeface="Cambria Math" panose="02040503050406030204" pitchFamily="18" charset="0"/>
+                                </a:rPr>
+                              </m:ctrlPr>
+                            </m:dPr>
+                            <m:e>
+                              <m:r>
+                                <a:rPr lang="en-US" i="1">
+                                  <a:latin typeface="Cambria Math" panose="02040503050406030204" pitchFamily="18" charset="0"/>
+                                </a:rPr>
+                                <m:t>𝑋</m:t>
+                              </m:r>
+                              <m:r>
+                                <a:rPr lang="en-US" b="0" i="1" smtClean="0">
+                                  <a:latin typeface="Cambria Math" panose="02040503050406030204" pitchFamily="18" charset="0"/>
+                                </a:rPr>
+                                <m:t>,</m:t>
+                              </m:r>
+                              <m:r>
+                                <a:rPr lang="en-US" i="1">
+                                  <a:latin typeface="Cambria Math" panose="02040503050406030204" pitchFamily="18" charset="0"/>
+                                  <a:ea typeface="Cambria Math" panose="02040503050406030204" pitchFamily="18" charset="0"/>
+                                </a:rPr>
+                                <m:t>𝑌</m:t>
+                              </m:r>
+                            </m:e>
+                          </m:d>
+                        </m:e>
+                      </m:func>
+                      <m:r>
+                        <a:rPr lang="en-US" i="1">
+                          <a:latin typeface="Cambria Math" panose="02040503050406030204" pitchFamily="18" charset="0"/>
+                          <a:ea typeface="Cambria Math" panose="02040503050406030204" pitchFamily="18" charset="0"/>
+                        </a:rPr>
+                        <m:t>=</m:t>
+                      </m:r>
+                      <m:func>
+                        <m:funcPr>
+                          <m:ctrlPr>
+                            <a:rPr lang="en-US" i="1">
+                              <a:latin typeface="Cambria Math" panose="02040503050406030204" pitchFamily="18" charset="0"/>
+                              <a:ea typeface="Cambria Math" panose="02040503050406030204" pitchFamily="18" charset="0"/>
+                            </a:rPr>
+                          </m:ctrlPr>
+                        </m:funcPr>
+                        <m:fName>
+                          <m:r>
+                            <m:rPr>
+                              <m:sty m:val="p"/>
+                            </m:rPr>
+                            <a:rPr lang="en-US">
+                              <a:latin typeface="Cambria Math" panose="02040503050406030204" pitchFamily="18" charset="0"/>
+                              <a:ea typeface="Cambria Math" panose="02040503050406030204" pitchFamily="18" charset="0"/>
+                            </a:rPr>
+                            <m:t>Pr</m:t>
+                          </m:r>
+                        </m:fName>
+                        <m:e>
+                          <m:d>
+                            <m:dPr>
+                              <m:ctrlPr>
+                                <a:rPr lang="en-US" i="1">
+                                  <a:latin typeface="Cambria Math" panose="02040503050406030204" pitchFamily="18" charset="0"/>
+                                  <a:ea typeface="Cambria Math" panose="02040503050406030204" pitchFamily="18" charset="0"/>
+                                </a:rPr>
+                              </m:ctrlPr>
+                            </m:dPr>
+                            <m:e>
+                              <m:r>
+                                <a:rPr lang="en-US" b="0" i="1" smtClean="0">
+                                  <a:latin typeface="Cambria Math" panose="02040503050406030204" pitchFamily="18" charset="0"/>
+                                  <a:ea typeface="Cambria Math" panose="02040503050406030204" pitchFamily="18" charset="0"/>
+                                </a:rPr>
+                                <m:t>𝑌</m:t>
+                              </m:r>
+                              <m:r>
+                                <a:rPr lang="en-US" b="0" i="1" smtClean="0">
+                                  <a:latin typeface="Cambria Math" panose="02040503050406030204" pitchFamily="18" charset="0"/>
+                                  <a:ea typeface="Cambria Math" panose="02040503050406030204" pitchFamily="18" charset="0"/>
+                                </a:rPr>
+                                <m:t>|</m:t>
+                              </m:r>
+                              <m:r>
+                                <a:rPr lang="en-US" b="0" i="1" smtClean="0">
+                                  <a:latin typeface="Cambria Math" panose="02040503050406030204" pitchFamily="18" charset="0"/>
+                                  <a:ea typeface="Cambria Math" panose="02040503050406030204" pitchFamily="18" charset="0"/>
+                                </a:rPr>
+                                <m:t>𝑋</m:t>
+                              </m:r>
+                            </m:e>
+                          </m:d>
+                        </m:e>
+                      </m:func>
+                      <m:func>
+                        <m:funcPr>
+                          <m:ctrlPr>
+                            <a:rPr lang="en-US" i="1">
+                              <a:latin typeface="Cambria Math" panose="02040503050406030204" pitchFamily="18" charset="0"/>
+                              <a:ea typeface="Cambria Math" panose="02040503050406030204" pitchFamily="18" charset="0"/>
+                            </a:rPr>
+                          </m:ctrlPr>
+                        </m:funcPr>
+                        <m:fName>
+                          <m:r>
+                            <m:rPr>
+                              <m:sty m:val="p"/>
+                            </m:rPr>
+                            <a:rPr lang="en-US">
+                              <a:latin typeface="Cambria Math" panose="02040503050406030204" pitchFamily="18" charset="0"/>
+                              <a:ea typeface="Cambria Math" panose="02040503050406030204" pitchFamily="18" charset="0"/>
+                            </a:rPr>
+                            <m:t>Pr</m:t>
+                          </m:r>
+                        </m:fName>
+                        <m:e>
+                          <m:d>
+                            <m:dPr>
+                              <m:ctrlPr>
+                                <a:rPr lang="en-US" i="1">
+                                  <a:latin typeface="Cambria Math" panose="02040503050406030204" pitchFamily="18" charset="0"/>
+                                  <a:ea typeface="Cambria Math" panose="02040503050406030204" pitchFamily="18" charset="0"/>
+                                </a:rPr>
+                              </m:ctrlPr>
+                            </m:dPr>
+                            <m:e>
+                              <m:r>
+                                <a:rPr lang="en-US" b="0" i="1" smtClean="0">
+                                  <a:latin typeface="Cambria Math" panose="02040503050406030204" pitchFamily="18" charset="0"/>
+                                  <a:ea typeface="Cambria Math" panose="02040503050406030204" pitchFamily="18" charset="0"/>
+                                </a:rPr>
+                                <m:t>𝑋</m:t>
+                              </m:r>
+                            </m:e>
+                          </m:d>
+                        </m:e>
+                      </m:func>
+                    </m:oMath>
+                  </m:oMathPara>
+                </a14:m>
+                <a:endParaRPr lang="en-US" dirty="0"/>
+              </a:p>
+              <a:p>
+                <a:pPr lvl="1" indent="-342900"/>
+                <a:r>
+                  <a:rPr lang="en-US" dirty="0" smtClean="0"/>
+                  <a:t>Often easier to specify conditional probabilities than joint probabilities</a:t>
+                </a:r>
+              </a:p>
+              <a:p>
+                <a:pPr marL="514350" indent="-514350">
+                  <a:buFont typeface="+mj-lt"/>
+                  <a:buAutoNum type="arabicPeriod"/>
+                </a:pPr>
+                <a:endParaRPr lang="en-US" dirty="0" smtClean="0"/>
+              </a:p>
+              <a:p>
+                <a:pPr marL="514350" indent="-514350">
+                  <a:buFont typeface="+mj-lt"/>
+                  <a:buAutoNum type="arabicPeriod"/>
+                </a:pPr>
+                <a:r>
+                  <a:rPr lang="en-US" dirty="0" smtClean="0"/>
+                  <a:t>Law of total probability</a:t>
+                </a:r>
+              </a:p>
+              <a:p>
+                <a:pPr marL="0" indent="0">
+                  <a:buNone/>
+                </a:pPr>
+                <a14:m>
+                  <m:oMathPara xmlns:m="http://schemas.openxmlformats.org/officeDocument/2006/math">
+                    <m:oMathParaPr>
+                      <m:jc m:val="centerGroup"/>
+                    </m:oMathParaPr>
+                    <m:oMath xmlns:m="http://schemas.openxmlformats.org/officeDocument/2006/math">
+                      <m:func>
+                        <m:funcPr>
+                          <m:ctrlPr>
+                            <a:rPr lang="en-US" b="0" i="1" smtClean="0">
+                              <a:latin typeface="Cambria Math" panose="02040503050406030204" pitchFamily="18" charset="0"/>
+                            </a:rPr>
+                          </m:ctrlPr>
+                        </m:funcPr>
+                        <m:fName>
+                          <m:r>
+                            <m:rPr>
+                              <m:sty m:val="p"/>
+                            </m:rPr>
+                            <a:rPr lang="en-US" b="0" i="0" smtClean="0">
+                              <a:latin typeface="Cambria Math" panose="02040503050406030204" pitchFamily="18" charset="0"/>
+                            </a:rPr>
+                            <m:t>Pr</m:t>
+                          </m:r>
+                        </m:fName>
+                        <m:e>
+                          <m:d>
+                            <m:dPr>
+                              <m:ctrlPr>
+                                <a:rPr lang="en-US" b="0" i="1" smtClean="0">
+                                  <a:latin typeface="Cambria Math" panose="02040503050406030204" pitchFamily="18" charset="0"/>
+                                </a:rPr>
+                              </m:ctrlPr>
+                            </m:dPr>
+                            <m:e>
+                              <m:r>
+                                <a:rPr lang="en-US" b="0" i="1" smtClean="0">
+                                  <a:latin typeface="Cambria Math" panose="02040503050406030204" pitchFamily="18" charset="0"/>
+                                </a:rPr>
+                                <m:t>𝑋</m:t>
+                              </m:r>
+                            </m:e>
+                          </m:d>
+                        </m:e>
+                      </m:func>
+                      <m:r>
+                        <a:rPr lang="en-US" b="0" i="1" smtClean="0">
+                          <a:latin typeface="Cambria Math" panose="02040503050406030204" pitchFamily="18" charset="0"/>
+                        </a:rPr>
+                        <m:t>=</m:t>
+                      </m:r>
+                      <m:nary>
+                        <m:naryPr>
+                          <m:limLoc m:val="undOvr"/>
+                          <m:subHide m:val="on"/>
+                          <m:supHide m:val="on"/>
+                          <m:ctrlPr>
+                            <a:rPr lang="en-US" b="0" i="1" smtClean="0">
+                              <a:latin typeface="Cambria Math" panose="02040503050406030204" pitchFamily="18" charset="0"/>
+                            </a:rPr>
+                          </m:ctrlPr>
+                        </m:naryPr>
+                        <m:sub/>
+                        <m:sup/>
+                        <m:e>
+                          <m:r>
+                            <m:rPr>
+                              <m:sty m:val="p"/>
+                            </m:rPr>
+                            <a:rPr lang="en-US" b="0" i="0" smtClean="0">
+                              <a:latin typeface="Cambria Math" panose="02040503050406030204" pitchFamily="18" charset="0"/>
+                            </a:rPr>
+                            <m:t>Pr</m:t>
+                          </m:r>
+                          <m:r>
+                            <a:rPr lang="en-US" b="0" i="1" smtClean="0">
+                              <a:latin typeface="Cambria Math" panose="02040503050406030204" pitchFamily="18" charset="0"/>
+                            </a:rPr>
+                            <m:t>⁡(</m:t>
+                          </m:r>
+                          <m:r>
+                            <a:rPr lang="en-US" b="0" i="1" smtClean="0">
+                              <a:latin typeface="Cambria Math" panose="02040503050406030204" pitchFamily="18" charset="0"/>
+                            </a:rPr>
+                            <m:t>𝑋</m:t>
+                          </m:r>
+                          <m:r>
+                            <a:rPr lang="en-US" b="0" i="1" smtClean="0">
+                              <a:latin typeface="Cambria Math" panose="02040503050406030204" pitchFamily="18" charset="0"/>
+                            </a:rPr>
+                            <m:t>,</m:t>
+                          </m:r>
+                          <m:r>
+                            <a:rPr lang="en-US" b="0" i="1" smtClean="0">
+                              <a:latin typeface="Cambria Math" panose="02040503050406030204" pitchFamily="18" charset="0"/>
+                            </a:rPr>
+                            <m:t>𝑌</m:t>
+                          </m:r>
+                          <m:r>
+                            <a:rPr lang="en-US" b="0" i="0" smtClean="0">
+                              <a:latin typeface="Cambria Math" panose="02040503050406030204" pitchFamily="18" charset="0"/>
+                            </a:rPr>
+                            <m:t>)</m:t>
+                          </m:r>
+                          <m:r>
+                            <m:rPr>
+                              <m:sty m:val="p"/>
+                            </m:rPr>
+                            <a:rPr lang="en-US" b="0" i="0" smtClean="0">
+                              <a:latin typeface="Cambria Math" panose="02040503050406030204" pitchFamily="18" charset="0"/>
+                            </a:rPr>
+                            <m:t>d</m:t>
+                          </m:r>
+                          <m:r>
+                            <a:rPr lang="en-US" b="0" i="1" smtClean="0">
+                              <a:latin typeface="Cambria Math" panose="02040503050406030204" pitchFamily="18" charset="0"/>
+                            </a:rPr>
+                            <m:t>𝑌</m:t>
+                          </m:r>
+                        </m:e>
+                      </m:nary>
+                    </m:oMath>
+                  </m:oMathPara>
+                </a14:m>
+                <a:endParaRPr lang="en-US" dirty="0" smtClean="0"/>
+              </a:p>
+              <a:p>
+                <a:pPr lvl="1"/>
+                <a:r>
+                  <a:rPr lang="en-US" dirty="0" smtClean="0"/>
+                  <a:t>Used when justifying hierarchical models</a:t>
+                </a:r>
+                <a:endParaRPr lang="en-US" dirty="0"/>
+              </a:p>
+            </p:txBody>
+          </p:sp>
+        </mc:Choice>
+        <mc:Fallback xmlns="">
+          <p:sp>
+            <p:nvSpPr>
+              <p:cNvPr id="3" name="Content Placeholder 2"/>
+              <p:cNvSpPr>
+                <a:spLocks noGrp="1" noRot="1" noChangeAspect="1" noMove="1" noResize="1" noEditPoints="1" noAdjustHandles="1" noChangeArrowheads="1" noChangeShapeType="1" noTextEdit="1"/>
+              </p:cNvSpPr>
+              <p:nvPr>
+                <p:ph idx="1"/>
+              </p:nvPr>
+            </p:nvSpPr>
+            <p:spPr>
+              <a:blipFill>
+                <a:blip r:embed="rId2"/>
+                <a:stretch>
+                  <a:fillRect l="-1763" t="-1333"/>
+                </a:stretch>
+              </a:blipFill>
+            </p:spPr>
+            <p:txBody>
+              <a:bodyPr/>
+              <a:lstStyle/>
+              <a:p>
+                <a:r>
+                  <a:rPr lang="en-GB">
+                    <a:noFill/>
+                  </a:rPr>
+                  <a:t> </a:t>
+                </a:r>
+              </a:p>
+            </p:txBody>
+          </p:sp>
+        </mc:Fallback>
+      </mc:AlternateContent>
+    </p:spTree>
+    <p:extLst>
+      <p:ext uri="{BB962C8B-B14F-4D97-AF65-F5344CB8AC3E}">
+        <p14:creationId xmlns:p14="http://schemas.microsoft.com/office/powerpoint/2010/main" val="3520951298"/>
+      </p:ext>
+    </p:extLst>
+  </p:cSld>
+  <p:clrMapOvr>
+    <a:masterClrMapping/>
+  </p:clrMapOvr>
+  <p:timing>
+    <p:tnLst>
+      <p:par>
+        <p:cTn id="1" dur="indefinite" restart="never" nodeType="tmRoot"/>
+      </p:par>
+    </p:tnLst>
+  </p:timing>
+</p:sld>
+</file>
+
+<file path=ppt/slides/slide20.xml><?xml version="1.0" encoding="utf-8"?>
 <p:sld xmlns:a="http://schemas.openxmlformats.org/drawingml/2006/main" xmlns:r="http://schemas.openxmlformats.org/officeDocument/2006/relationships" xmlns:p="http://schemas.openxmlformats.org/presentationml/2006/main">
   <p:cSld>
     <p:spTree>
@@ -8527,469 +9838,6 @@
   <p:clrMapOvr>
     <a:masterClrMapping/>
   </p:clrMapOvr>
-</p:sld>
-</file>
-
-<file path=ppt/slides/slide2.xml><?xml version="1.0" encoding="utf-8"?>
-<p:sld xmlns:a="http://schemas.openxmlformats.org/drawingml/2006/main" xmlns:r="http://schemas.openxmlformats.org/officeDocument/2006/relationships" xmlns:p="http://schemas.openxmlformats.org/presentationml/2006/main">
-  <p:cSld>
-    <p:spTree>
-      <p:nvGrpSpPr>
-        <p:cNvPr id="1" name=""/>
-        <p:cNvGrpSpPr/>
-        <p:nvPr/>
-      </p:nvGrpSpPr>
-      <p:grpSpPr>
-        <a:xfrm>
-          <a:off x="0" y="0"/>
-          <a:ext cx="0" cy="0"/>
-          <a:chOff x="0" y="0"/>
-          <a:chExt cx="0" cy="0"/>
-        </a:xfrm>
-      </p:grpSpPr>
-      <p:sp>
-        <p:nvSpPr>
-          <p:cNvPr id="2" name="Title 1"/>
-          <p:cNvSpPr>
-            <a:spLocks noGrp="1"/>
-          </p:cNvSpPr>
-          <p:nvPr>
-            <p:ph type="title"/>
-          </p:nvPr>
-        </p:nvSpPr>
-        <p:spPr/>
-        <p:txBody>
-          <a:bodyPr/>
-          <a:lstStyle/>
-          <a:p>
-            <a:r>
-              <a:rPr lang="en-US" dirty="0" smtClean="0"/>
-              <a:t>Mixed-effects models</a:t>
-            </a:r>
-            <a:endParaRPr lang="en-US" dirty="0"/>
-          </a:p>
-        </p:txBody>
-      </p:sp>
-      <mc:AlternateContent xmlns:mc="http://schemas.openxmlformats.org/markup-compatibility/2006" xmlns:a14="http://schemas.microsoft.com/office/drawing/2010/main">
-        <mc:Choice Requires="a14">
-          <p:sp>
-            <p:nvSpPr>
-              <p:cNvPr id="3" name="Content Placeholder 2"/>
-              <p:cNvSpPr>
-                <a:spLocks noGrp="1"/>
-              </p:cNvSpPr>
-              <p:nvPr>
-                <p:ph idx="1"/>
-              </p:nvPr>
-            </p:nvSpPr>
-            <p:spPr/>
-            <p:txBody>
-              <a:bodyPr>
-                <a:normAutofit/>
-              </a:bodyPr>
-              <a:lstStyle/>
-              <a:p>
-                <a:pPr marL="0" indent="0">
-                  <a:buNone/>
-                </a:pPr>
-                <a:r>
-                  <a:rPr lang="en-US" sz="3200" b="1" dirty="0" smtClean="0"/>
-                  <a:t>Laws of probability</a:t>
-                </a:r>
-              </a:p>
-              <a:p>
-                <a:pPr marL="514350" indent="-514350">
-                  <a:buFont typeface="+mj-lt"/>
-                  <a:buAutoNum type="arabicPeriod"/>
-                </a:pPr>
-                <a:r>
-                  <a:rPr lang="en-US" dirty="0" smtClean="0"/>
-                  <a:t>Axiom of conditional probability</a:t>
-                </a:r>
-              </a:p>
-              <a:p>
-                <a:pPr marL="400050" lvl="1" indent="0">
-                  <a:buNone/>
-                </a:pPr>
-                <a14:m>
-                  <m:oMathPara xmlns:m="http://schemas.openxmlformats.org/officeDocument/2006/math">
-                    <m:oMathParaPr>
-                      <m:jc m:val="centerGroup"/>
-                    </m:oMathParaPr>
-                    <m:oMath xmlns:m="http://schemas.openxmlformats.org/officeDocument/2006/math">
-                      <m:func>
-                        <m:funcPr>
-                          <m:ctrlPr>
-                            <a:rPr lang="en-US" i="1">
-                              <a:latin typeface="Cambria Math" panose="02040503050406030204" pitchFamily="18" charset="0"/>
-                            </a:rPr>
-                          </m:ctrlPr>
-                        </m:funcPr>
-                        <m:fName>
-                          <m:r>
-                            <m:rPr>
-                              <m:sty m:val="p"/>
-                            </m:rPr>
-                            <a:rPr lang="en-US">
-                              <a:latin typeface="Cambria Math" panose="02040503050406030204" pitchFamily="18" charset="0"/>
-                            </a:rPr>
-                            <m:t>Pr</m:t>
-                          </m:r>
-                        </m:fName>
-                        <m:e>
-                          <m:d>
-                            <m:dPr>
-                              <m:ctrlPr>
-                                <a:rPr lang="en-US" i="1">
-                                  <a:latin typeface="Cambria Math" panose="02040503050406030204" pitchFamily="18" charset="0"/>
-                                </a:rPr>
-                              </m:ctrlPr>
-                            </m:dPr>
-                            <m:e>
-                              <m:r>
-                                <a:rPr lang="en-US" i="1">
-                                  <a:latin typeface="Cambria Math" panose="02040503050406030204" pitchFamily="18" charset="0"/>
-                                </a:rPr>
-                                <m:t>𝑋</m:t>
-                              </m:r>
-                              <m:r>
-                                <a:rPr lang="en-US" b="0" i="1" smtClean="0">
-                                  <a:latin typeface="Cambria Math" panose="02040503050406030204" pitchFamily="18" charset="0"/>
-                                </a:rPr>
-                                <m:t>,</m:t>
-                              </m:r>
-                              <m:r>
-                                <a:rPr lang="en-US" i="1">
-                                  <a:latin typeface="Cambria Math" panose="02040503050406030204" pitchFamily="18" charset="0"/>
-                                  <a:ea typeface="Cambria Math" panose="02040503050406030204" pitchFamily="18" charset="0"/>
-                                </a:rPr>
-                                <m:t>𝑌</m:t>
-                              </m:r>
-                            </m:e>
-                          </m:d>
-                        </m:e>
-                      </m:func>
-                      <m:r>
-                        <a:rPr lang="en-US" i="1">
-                          <a:latin typeface="Cambria Math" panose="02040503050406030204" pitchFamily="18" charset="0"/>
-                          <a:ea typeface="Cambria Math" panose="02040503050406030204" pitchFamily="18" charset="0"/>
-                        </a:rPr>
-                        <m:t>=</m:t>
-                      </m:r>
-                      <m:func>
-                        <m:funcPr>
-                          <m:ctrlPr>
-                            <a:rPr lang="en-US" i="1">
-                              <a:latin typeface="Cambria Math" panose="02040503050406030204" pitchFamily="18" charset="0"/>
-                              <a:ea typeface="Cambria Math" panose="02040503050406030204" pitchFamily="18" charset="0"/>
-                            </a:rPr>
-                          </m:ctrlPr>
-                        </m:funcPr>
-                        <m:fName>
-                          <m:r>
-                            <m:rPr>
-                              <m:sty m:val="p"/>
-                            </m:rPr>
-                            <a:rPr lang="en-US">
-                              <a:latin typeface="Cambria Math" panose="02040503050406030204" pitchFamily="18" charset="0"/>
-                              <a:ea typeface="Cambria Math" panose="02040503050406030204" pitchFamily="18" charset="0"/>
-                            </a:rPr>
-                            <m:t>Pr</m:t>
-                          </m:r>
-                        </m:fName>
-                        <m:e>
-                          <m:d>
-                            <m:dPr>
-                              <m:ctrlPr>
-                                <a:rPr lang="en-US" i="1">
-                                  <a:latin typeface="Cambria Math" panose="02040503050406030204" pitchFamily="18" charset="0"/>
-                                  <a:ea typeface="Cambria Math" panose="02040503050406030204" pitchFamily="18" charset="0"/>
-                                </a:rPr>
-                              </m:ctrlPr>
-                            </m:dPr>
-                            <m:e>
-                              <m:r>
-                                <a:rPr lang="en-US" b="0" i="1" smtClean="0">
-                                  <a:latin typeface="Cambria Math" panose="02040503050406030204" pitchFamily="18" charset="0"/>
-                                  <a:ea typeface="Cambria Math" panose="02040503050406030204" pitchFamily="18" charset="0"/>
-                                </a:rPr>
-                                <m:t>𝑌</m:t>
-                              </m:r>
-                              <m:r>
-                                <a:rPr lang="en-US" b="0" i="1" smtClean="0">
-                                  <a:latin typeface="Cambria Math" panose="02040503050406030204" pitchFamily="18" charset="0"/>
-                                  <a:ea typeface="Cambria Math" panose="02040503050406030204" pitchFamily="18" charset="0"/>
-                                </a:rPr>
-                                <m:t>|</m:t>
-                              </m:r>
-                              <m:r>
-                                <a:rPr lang="en-US" b="0" i="1" smtClean="0">
-                                  <a:latin typeface="Cambria Math" panose="02040503050406030204" pitchFamily="18" charset="0"/>
-                                  <a:ea typeface="Cambria Math" panose="02040503050406030204" pitchFamily="18" charset="0"/>
-                                </a:rPr>
-                                <m:t>𝑋</m:t>
-                              </m:r>
-                            </m:e>
-                          </m:d>
-                        </m:e>
-                      </m:func>
-                      <m:func>
-                        <m:funcPr>
-                          <m:ctrlPr>
-                            <a:rPr lang="en-US" i="1">
-                              <a:latin typeface="Cambria Math" panose="02040503050406030204" pitchFamily="18" charset="0"/>
-                              <a:ea typeface="Cambria Math" panose="02040503050406030204" pitchFamily="18" charset="0"/>
-                            </a:rPr>
-                          </m:ctrlPr>
-                        </m:funcPr>
-                        <m:fName>
-                          <m:r>
-                            <m:rPr>
-                              <m:sty m:val="p"/>
-                            </m:rPr>
-                            <a:rPr lang="en-US">
-                              <a:latin typeface="Cambria Math" panose="02040503050406030204" pitchFamily="18" charset="0"/>
-                              <a:ea typeface="Cambria Math" panose="02040503050406030204" pitchFamily="18" charset="0"/>
-                            </a:rPr>
-                            <m:t>Pr</m:t>
-                          </m:r>
-                        </m:fName>
-                        <m:e>
-                          <m:d>
-                            <m:dPr>
-                              <m:ctrlPr>
-                                <a:rPr lang="en-US" i="1">
-                                  <a:latin typeface="Cambria Math" panose="02040503050406030204" pitchFamily="18" charset="0"/>
-                                  <a:ea typeface="Cambria Math" panose="02040503050406030204" pitchFamily="18" charset="0"/>
-                                </a:rPr>
-                              </m:ctrlPr>
-                            </m:dPr>
-                            <m:e>
-                              <m:r>
-                                <a:rPr lang="en-US" b="0" i="1" smtClean="0">
-                                  <a:latin typeface="Cambria Math" panose="02040503050406030204" pitchFamily="18" charset="0"/>
-                                  <a:ea typeface="Cambria Math" panose="02040503050406030204" pitchFamily="18" charset="0"/>
-                                </a:rPr>
-                                <m:t>𝑋</m:t>
-                              </m:r>
-                            </m:e>
-                          </m:d>
-                        </m:e>
-                      </m:func>
-                    </m:oMath>
-                  </m:oMathPara>
-                </a14:m>
-                <a:endParaRPr lang="en-US" dirty="0"/>
-              </a:p>
-              <a:p>
-                <a:pPr lvl="1" indent="-342900"/>
-                <a:r>
-                  <a:rPr lang="en-US" dirty="0" smtClean="0"/>
-                  <a:t>Often easier to specify conditional probabilities than joint probabilities</a:t>
-                </a:r>
-              </a:p>
-              <a:p>
-                <a:pPr marL="514350" indent="-514350">
-                  <a:buFont typeface="+mj-lt"/>
-                  <a:buAutoNum type="arabicPeriod"/>
-                </a:pPr>
-                <a:endParaRPr lang="en-US" dirty="0" smtClean="0"/>
-              </a:p>
-              <a:p>
-                <a:pPr marL="514350" indent="-514350">
-                  <a:buFont typeface="+mj-lt"/>
-                  <a:buAutoNum type="arabicPeriod"/>
-                </a:pPr>
-                <a:r>
-                  <a:rPr lang="en-US" dirty="0" smtClean="0"/>
-                  <a:t>Law of total probability</a:t>
-                </a:r>
-              </a:p>
-              <a:p>
-                <a:pPr marL="0" indent="0">
-                  <a:buNone/>
-                </a:pPr>
-                <a14:m>
-                  <m:oMathPara xmlns:m="http://schemas.openxmlformats.org/officeDocument/2006/math">
-                    <m:oMathParaPr>
-                      <m:jc m:val="centerGroup"/>
-                    </m:oMathParaPr>
-                    <m:oMath xmlns:m="http://schemas.openxmlformats.org/officeDocument/2006/math">
-                      <m:func>
-                        <m:funcPr>
-                          <m:ctrlPr>
-                            <a:rPr lang="en-US" b="0" i="1" smtClean="0">
-                              <a:latin typeface="Cambria Math" panose="02040503050406030204" pitchFamily="18" charset="0"/>
-                            </a:rPr>
-                          </m:ctrlPr>
-                        </m:funcPr>
-                        <m:fName>
-                          <m:r>
-                            <m:rPr>
-                              <m:sty m:val="p"/>
-                            </m:rPr>
-                            <a:rPr lang="en-US" b="0" i="0" smtClean="0">
-                              <a:latin typeface="Cambria Math" panose="02040503050406030204" pitchFamily="18" charset="0"/>
-                            </a:rPr>
-                            <m:t>Pr</m:t>
-                          </m:r>
-                        </m:fName>
-                        <m:e>
-                          <m:d>
-                            <m:dPr>
-                              <m:ctrlPr>
-                                <a:rPr lang="en-US" b="0" i="1" smtClean="0">
-                                  <a:latin typeface="Cambria Math" panose="02040503050406030204" pitchFamily="18" charset="0"/>
-                                </a:rPr>
-                              </m:ctrlPr>
-                            </m:dPr>
-                            <m:e>
-                              <m:r>
-                                <a:rPr lang="en-US" b="0" i="1" smtClean="0">
-                                  <a:latin typeface="Cambria Math" panose="02040503050406030204" pitchFamily="18" charset="0"/>
-                                </a:rPr>
-                                <m:t>𝑋</m:t>
-                              </m:r>
-                            </m:e>
-                          </m:d>
-                        </m:e>
-                      </m:func>
-                      <m:r>
-                        <a:rPr lang="en-US" b="0" i="1" smtClean="0">
-                          <a:latin typeface="Cambria Math" panose="02040503050406030204" pitchFamily="18" charset="0"/>
-                        </a:rPr>
-                        <m:t>=</m:t>
-                      </m:r>
-                      <m:nary>
-                        <m:naryPr>
-                          <m:limLoc m:val="undOvr"/>
-                          <m:subHide m:val="on"/>
-                          <m:supHide m:val="on"/>
-                          <m:ctrlPr>
-                            <a:rPr lang="en-US" b="0" i="1" smtClean="0">
-                              <a:latin typeface="Cambria Math" panose="02040503050406030204" pitchFamily="18" charset="0"/>
-                            </a:rPr>
-                          </m:ctrlPr>
-                        </m:naryPr>
-                        <m:sub/>
-                        <m:sup/>
-                        <m:e>
-                          <m:r>
-                            <m:rPr>
-                              <m:sty m:val="p"/>
-                            </m:rPr>
-                            <a:rPr lang="en-US" b="0" i="0" smtClean="0">
-                              <a:latin typeface="Cambria Math" panose="02040503050406030204" pitchFamily="18" charset="0"/>
-                            </a:rPr>
-                            <m:t>Pr</m:t>
-                          </m:r>
-                          <m:r>
-                            <a:rPr lang="en-US" b="0" i="1" smtClean="0">
-                              <a:latin typeface="Cambria Math" panose="02040503050406030204" pitchFamily="18" charset="0"/>
-                            </a:rPr>
-                            <m:t>⁡(</m:t>
-                          </m:r>
-                          <m:r>
-                            <a:rPr lang="en-US" b="0" i="1" smtClean="0">
-                              <a:latin typeface="Cambria Math" panose="02040503050406030204" pitchFamily="18" charset="0"/>
-                            </a:rPr>
-                            <m:t>𝑋</m:t>
-                          </m:r>
-                          <m:r>
-                            <a:rPr lang="en-US" b="0" i="1" smtClean="0">
-                              <a:latin typeface="Cambria Math" panose="02040503050406030204" pitchFamily="18" charset="0"/>
-                            </a:rPr>
-                            <m:t>,</m:t>
-                          </m:r>
-                          <m:r>
-                            <a:rPr lang="en-US" b="0" i="1" smtClean="0">
-                              <a:latin typeface="Cambria Math" panose="02040503050406030204" pitchFamily="18" charset="0"/>
-                            </a:rPr>
-                            <m:t>𝑌</m:t>
-                          </m:r>
-                          <m:r>
-                            <a:rPr lang="en-US" b="0" i="0" smtClean="0">
-                              <a:latin typeface="Cambria Math" panose="02040503050406030204" pitchFamily="18" charset="0"/>
-                            </a:rPr>
-                            <m:t>)</m:t>
-                          </m:r>
-                          <m:r>
-                            <m:rPr>
-                              <m:sty m:val="p"/>
-                            </m:rPr>
-                            <a:rPr lang="en-US" b="0" i="0" smtClean="0">
-                              <a:latin typeface="Cambria Math" panose="02040503050406030204" pitchFamily="18" charset="0"/>
-                            </a:rPr>
-                            <m:t>d</m:t>
-                          </m:r>
-                          <m:r>
-                            <a:rPr lang="en-US" b="0" i="1" smtClean="0">
-                              <a:latin typeface="Cambria Math" panose="02040503050406030204" pitchFamily="18" charset="0"/>
-                            </a:rPr>
-                            <m:t>𝑌</m:t>
-                          </m:r>
-                        </m:e>
-                      </m:nary>
-                    </m:oMath>
-                  </m:oMathPara>
-                </a14:m>
-                <a:endParaRPr lang="en-US" dirty="0" smtClean="0"/>
-              </a:p>
-              <a:p>
-                <a:pPr lvl="1"/>
-                <a:r>
-                  <a:rPr lang="en-US" dirty="0" smtClean="0"/>
-                  <a:t>Used when justifying hierarchical models</a:t>
-                </a:r>
-                <a:endParaRPr lang="en-US" dirty="0"/>
-              </a:p>
-            </p:txBody>
-          </p:sp>
-        </mc:Choice>
-        <mc:Fallback xmlns="">
-          <p:sp>
-            <p:nvSpPr>
-              <p:cNvPr id="3" name="Content Placeholder 2"/>
-              <p:cNvSpPr>
-                <a:spLocks noGrp="1" noRot="1" noChangeAspect="1" noMove="1" noResize="1" noEditPoints="1" noAdjustHandles="1" noChangeArrowheads="1" noChangeShapeType="1" noTextEdit="1"/>
-              </p:cNvSpPr>
-              <p:nvPr>
-                <p:ph idx="1"/>
-              </p:nvPr>
-            </p:nvSpPr>
-            <p:spPr>
-              <a:blipFill>
-                <a:blip r:embed="rId2"/>
-                <a:stretch>
-                  <a:fillRect l="-1763" t="-1333"/>
-                </a:stretch>
-              </a:blipFill>
-            </p:spPr>
-            <p:txBody>
-              <a:bodyPr/>
-              <a:lstStyle/>
-              <a:p>
-                <a:r>
-                  <a:rPr lang="en-GB">
-                    <a:noFill/>
-                  </a:rPr>
-                  <a:t> </a:t>
-                </a:r>
-              </a:p>
-            </p:txBody>
-          </p:sp>
-        </mc:Fallback>
-      </mc:AlternateContent>
-    </p:spTree>
-    <p:extLst>
-      <p:ext uri="{BB962C8B-B14F-4D97-AF65-F5344CB8AC3E}">
-        <p14:creationId xmlns:p14="http://schemas.microsoft.com/office/powerpoint/2010/main" val="3520951298"/>
-      </p:ext>
-    </p:extLst>
-  </p:cSld>
-  <p:clrMapOvr>
-    <a:masterClrMapping/>
-  </p:clrMapOvr>
   <p:timing>
     <p:tnLst>
       <p:par>
@@ -9000,7 +9848,7 @@
 </p:sld>
 </file>
 
-<file path=ppt/slides/slide20.xml><?xml version="1.0" encoding="utf-8"?>
+<file path=ppt/slides/slide21.xml><?xml version="1.0" encoding="utf-8"?>
 <p:sld xmlns:a="http://schemas.openxmlformats.org/drawingml/2006/main" xmlns:r="http://schemas.openxmlformats.org/officeDocument/2006/relationships" xmlns:p="http://schemas.openxmlformats.org/presentationml/2006/main">
   <p:cSld>
     <p:spTree>
@@ -9577,7 +10425,7 @@
 </p:sld>
 </file>
 
-<file path=ppt/slides/slide21.xml><?xml version="1.0" encoding="utf-8"?>
+<file path=ppt/slides/slide22.xml><?xml version="1.0" encoding="utf-8"?>
 <p:sld xmlns:a="http://schemas.openxmlformats.org/drawingml/2006/main" xmlns:r="http://schemas.openxmlformats.org/officeDocument/2006/relationships" xmlns:p="http://schemas.openxmlformats.org/presentationml/2006/main">
   <p:cSld>
     <p:spTree>
@@ -9956,7 +10804,7 @@
 </p:sld>
 </file>
 
-<file path=ppt/slides/slide22.xml><?xml version="1.0" encoding="utf-8"?>
+<file path=ppt/slides/slide23.xml><?xml version="1.0" encoding="utf-8"?>
 <p:sld xmlns:a="http://schemas.openxmlformats.org/drawingml/2006/main" xmlns:r="http://schemas.openxmlformats.org/officeDocument/2006/relationships" xmlns:p="http://schemas.openxmlformats.org/presentationml/2006/main">
   <p:cSld>
     <p:spTree>
@@ -11265,7 +12113,7 @@
 </p:sld>
 </file>
 
-<file path=ppt/slides/slide23.xml><?xml version="1.0" encoding="utf-8"?>
+<file path=ppt/slides/slide24.xml><?xml version="1.0" encoding="utf-8"?>
 <p:sld xmlns:a="http://schemas.openxmlformats.org/drawingml/2006/main" xmlns:r="http://schemas.openxmlformats.org/officeDocument/2006/relationships" xmlns:p="http://schemas.openxmlformats.org/presentationml/2006/main">
   <p:cSld>
     <p:spTree>
@@ -11978,7 +12826,7 @@
 </p:sld>
 </file>
 
-<file path=ppt/slides/slide24.xml><?xml version="1.0" encoding="utf-8"?>
+<file path=ppt/slides/slide25.xml><?xml version="1.0" encoding="utf-8"?>
 <p:sld xmlns:a="http://schemas.openxmlformats.org/drawingml/2006/main" xmlns:r="http://schemas.openxmlformats.org/officeDocument/2006/relationships" xmlns:p="http://schemas.openxmlformats.org/presentationml/2006/main">
   <p:cSld>
     <p:spTree>
@@ -12060,6 +12908,13 @@
   <p:clrMapOvr>
     <a:masterClrMapping/>
   </p:clrMapOvr>
+  <p:timing>
+    <p:tnLst>
+      <p:par>
+        <p:cTn id="1" dur="indefinite" restart="never" nodeType="tmRoot"/>
+      </p:par>
+    </p:tnLst>
+  </p:timing>
 </p:sld>
 </file>
 
@@ -12102,8 +12957,8 @@
           </a:p>
         </p:txBody>
       </p:sp>
-      <mc:AlternateContent xmlns:mc="http://schemas.openxmlformats.org/markup-compatibility/2006">
-        <mc:Choice xmlns:a14="http://schemas.microsoft.com/office/drawing/2010/main" Requires="a14">
+      <mc:AlternateContent xmlns:mc="http://schemas.openxmlformats.org/markup-compatibility/2006" xmlns:a14="http://schemas.microsoft.com/office/drawing/2010/main">
+        <mc:Choice Requires="a14">
           <p:sp>
             <p:nvSpPr>
               <p:cNvPr id="3" name="Content Placeholder 2"/>
@@ -13554,7 +14409,7 @@
             </p:txBody>
           </p:sp>
         </mc:Choice>
-        <mc:Fallback>
+        <mc:Fallback xmlns="">
           <p:sp>
             <p:nvSpPr>
               <p:cNvPr id="3" name="Content Placeholder 2"/>
@@ -16419,6 +17274,71 @@
                       <m:jc m:val="centerGroup"/>
                     </m:oMathParaPr>
                     <m:oMath xmlns:m="http://schemas.openxmlformats.org/officeDocument/2006/math">
+                      <m:r>
+                        <a:rPr lang="en-US" b="0" i="1" smtClean="0">
+                          <a:latin typeface="Cambria Math" panose="02040503050406030204" pitchFamily="18" charset="0"/>
+                        </a:rPr>
+                        <m:t>𝑋</m:t>
+                      </m:r>
+                      <m:r>
+                        <a:rPr lang="en-US" b="0" i="1" smtClean="0">
+                          <a:latin typeface="Cambria Math" panose="02040503050406030204" pitchFamily="18" charset="0"/>
+                        </a:rPr>
+                        <m:t>~</m:t>
+                      </m:r>
+                      <m:r>
+                        <a:rPr lang="en-US" b="0" i="1" smtClean="0">
+                          <a:latin typeface="Cambria Math" panose="02040503050406030204" pitchFamily="18" charset="0"/>
+                        </a:rPr>
+                        <m:t>𝐶h𝑖</m:t>
+                      </m:r>
+                      <m:r>
+                        <a:rPr lang="en-US" b="0" i="1" smtClean="0">
+                          <a:latin typeface="Cambria Math" panose="02040503050406030204" pitchFamily="18" charset="0"/>
+                        </a:rPr>
+                        <m:t>.</m:t>
+                      </m:r>
+                      <m:r>
+                        <a:rPr lang="en-US" b="0" i="1" smtClean="0">
+                          <a:latin typeface="Cambria Math" panose="02040503050406030204" pitchFamily="18" charset="0"/>
+                        </a:rPr>
+                        <m:t>𝑆𝑞𝑢𝑎𝑟𝑒𝑑</m:t>
+                      </m:r>
+                      <m:r>
+                        <a:rPr lang="en-US" b="0" i="1" smtClean="0">
+                          <a:latin typeface="Cambria Math" panose="02040503050406030204" pitchFamily="18" charset="0"/>
+                        </a:rPr>
+                        <m:t>(</m:t>
+                      </m:r>
+                      <m:r>
+                        <a:rPr lang="en-US" b="0" i="1" smtClean="0">
+                          <a:latin typeface="Cambria Math" panose="02040503050406030204" pitchFamily="18" charset="0"/>
+                        </a:rPr>
+                        <m:t>𝑘</m:t>
+                      </m:r>
+                      <m:r>
+                        <a:rPr lang="en-US" b="0" i="1" smtClean="0">
+                          <a:latin typeface="Cambria Math" panose="02040503050406030204" pitchFamily="18" charset="0"/>
+                        </a:rPr>
+                        <m:t>)</m:t>
+                      </m:r>
+                    </m:oMath>
+                  </m:oMathPara>
+                </a14:m>
+                <a:endParaRPr lang="en-US" b="0" i="1" dirty="0" smtClean="0">
+                  <a:latin typeface="Cambria Math" panose="02040503050406030204" pitchFamily="18" charset="0"/>
+                </a:endParaRPr>
+              </a:p>
+              <a:p>
+                <a:pPr marL="0" indent="0">
+                  <a:buNone/>
+                </a:pPr>
+                <a14:m>
+                  <m:oMathPara xmlns:m="http://schemas.openxmlformats.org/officeDocument/2006/math">
+                    <m:oMathParaPr>
+                      <m:jc m:val="centerGroup"/>
+                    </m:oMathParaPr>
+                    <m:oMath xmlns:m="http://schemas.openxmlformats.org/officeDocument/2006/math">
                       <m:func>
                         <m:funcPr>
                           <m:ctrlPr>
@@ -16450,6 +17370,18 @@
                             <m:e>
                               <m:r>
                                 <a:rPr lang="en-US" b="0" i="1" smtClean="0">
+                                  <a:latin typeface="Cambria Math" panose="02040503050406030204" pitchFamily="18" charset="0"/>
+                                </a:rPr>
+                                <m:t>𝑋</m:t>
+                              </m:r>
+                              <m:r>
+                                <a:rPr lang="en-US" b="0" i="1" smtClean="0">
+                                  <a:latin typeface="Cambria Math" panose="02040503050406030204" pitchFamily="18" charset="0"/>
+                                </a:rPr>
+                                <m:t>=</m:t>
+                              </m:r>
+                              <m:r>
+                                <a:rPr lang="en-US" b="0" i="1" smtClean="0">
                                   <a:latin typeface="Cambria Math"/>
                                 </a:rPr>
                                 <m:t>𝑥</m:t>
@@ -16459,130 +17391,112 @@
                         </m:e>
                       </m:func>
                       <m:r>
-                        <a:rPr lang="en-US" b="0" i="1" smtClean="0">
+                        <a:rPr lang="en-US" i="1">
                           <a:latin typeface="Cambria Math"/>
+                          <a:ea typeface="Cambria Math" panose="02040503050406030204" pitchFamily="18" charset="0"/>
                         </a:rPr>
-                        <m:t>=</m:t>
+                        <m:t>∝</m:t>
                       </m:r>
-                      <m:f>
-                        <m:fPr>
+                      <m:sSup>
+                        <m:sSupPr>
                           <m:ctrlPr>
-                            <a:rPr lang="en-US" b="0" i="1" smtClean="0">
+                            <a:rPr lang="en-US" i="1">
                               <a:latin typeface="Cambria Math" panose="02040503050406030204" pitchFamily="18" charset="0"/>
                             </a:rPr>
                           </m:ctrlPr>
-                        </m:fPr>
-                        <m:num>
-                          <m:sSup>
-                            <m:sSupPr>
+                        </m:sSupPr>
+                        <m:e>
+                          <m:r>
+                            <a:rPr lang="en-US" i="1">
+                              <a:latin typeface="Cambria Math"/>
+                            </a:rPr>
+                            <m:t>𝑥</m:t>
+                          </m:r>
+                        </m:e>
+                        <m:sup>
+                          <m:f>
+                            <m:fPr>
                               <m:ctrlPr>
-                                <a:rPr lang="en-US" b="0" i="1" smtClean="0">
+                                <a:rPr lang="en-US" i="1">
                                   <a:latin typeface="Cambria Math" panose="02040503050406030204" pitchFamily="18" charset="0"/>
                                 </a:rPr>
                               </m:ctrlPr>
-                            </m:sSupPr>
-                            <m:e>
-                              <m:r>
-                                <a:rPr lang="en-US" b="0" i="1" smtClean="0">
+                            </m:fPr>
+                            <m:num>
+                              <m:r>
+                                <a:rPr lang="en-US" i="1">
                                   <a:latin typeface="Cambria Math"/>
                                 </a:rPr>
+                                <m:t>𝑘</m:t>
+                              </m:r>
+                            </m:num>
+                            <m:den>
+                              <m:r>
+                                <a:rPr lang="en-US" i="1">
+                                  <a:latin typeface="Cambria Math"/>
+                                </a:rPr>
+                                <m:t>2</m:t>
+                              </m:r>
+                            </m:den>
+                          </m:f>
+                          <m:r>
+                            <a:rPr lang="en-US" i="1">
+                              <a:latin typeface="Cambria Math"/>
+                            </a:rPr>
+                            <m:t>−1</m:t>
+                          </m:r>
+                        </m:sup>
+                      </m:sSup>
+                      <m:sSup>
+                        <m:sSupPr>
+                          <m:ctrlPr>
+                            <a:rPr lang="en-US" i="1">
+                              <a:latin typeface="Cambria Math" panose="02040503050406030204" pitchFamily="18" charset="0"/>
+                            </a:rPr>
+                          </m:ctrlPr>
+                        </m:sSupPr>
+                        <m:e>
+                          <m:r>
+                            <a:rPr lang="en-US" i="1">
+                              <a:latin typeface="Cambria Math"/>
+                            </a:rPr>
+                            <m:t>𝑒</m:t>
+                          </m:r>
+                        </m:e>
+                        <m:sup>
+                          <m:f>
+                            <m:fPr>
+                              <m:ctrlPr>
+                                <a:rPr lang="en-US" i="1">
+                                  <a:latin typeface="Cambria Math" panose="02040503050406030204" pitchFamily="18" charset="0"/>
+                                </a:rPr>
+                              </m:ctrlPr>
+                            </m:fPr>
+                            <m:num>
+                              <m:r>
+                                <a:rPr lang="en-US" i="1">
+                                  <a:latin typeface="Cambria Math"/>
+                                </a:rPr>
+                                <m:t>−</m:t>
+                              </m:r>
+                              <m:r>
+                                <a:rPr lang="en-US" i="1">
+                                  <a:latin typeface="Cambria Math"/>
+                                </a:rPr>
                                 <m:t>𝑥</m:t>
                               </m:r>
-                            </m:e>
-                            <m:sup>
-                              <m:f>
-                                <m:fPr>
-                                  <m:ctrlPr>
-                                    <a:rPr lang="en-US" b="0" i="1" smtClean="0">
-                                      <a:latin typeface="Cambria Math" panose="02040503050406030204" pitchFamily="18" charset="0"/>
-                                    </a:rPr>
-                                  </m:ctrlPr>
-                                </m:fPr>
-                                <m:num>
-                                  <m:r>
-                                    <a:rPr lang="en-US" b="0" i="1" smtClean="0">
-                                      <a:latin typeface="Cambria Math"/>
-                                    </a:rPr>
-                                    <m:t>𝑘</m:t>
-                                  </m:r>
-                                </m:num>
-                                <m:den>
-                                  <m:r>
-                                    <a:rPr lang="en-US" b="0" i="1" smtClean="0">
-                                      <a:latin typeface="Cambria Math"/>
-                                    </a:rPr>
-                                    <m:t>2</m:t>
-                                  </m:r>
-                                </m:den>
-                              </m:f>
-                              <m:r>
-                                <a:rPr lang="en-US" b="0" i="1" smtClean="0">
+                            </m:num>
+                            <m:den>
+                              <m:r>
+                                <a:rPr lang="en-US" i="1">
                                   <a:latin typeface="Cambria Math"/>
                                 </a:rPr>
-                                <m:t>−1</m:t>
-                              </m:r>
-                            </m:sup>
-                          </m:sSup>
-                          <m:sSup>
-                            <m:sSupPr>
-                              <m:ctrlPr>
-                                <a:rPr lang="en-US" b="0" i="1" smtClean="0">
-                                  <a:latin typeface="Cambria Math" panose="02040503050406030204" pitchFamily="18" charset="0"/>
-                                </a:rPr>
-                              </m:ctrlPr>
-                            </m:sSupPr>
-                            <m:e>
-                              <m:r>
-                                <a:rPr lang="en-US" b="0" i="1" smtClean="0">
-                                  <a:latin typeface="Cambria Math"/>
-                                </a:rPr>
-                                <m:t>𝑒</m:t>
-                              </m:r>
-                            </m:e>
-                            <m:sup>
-                              <m:f>
-                                <m:fPr>
-                                  <m:ctrlPr>
-                                    <a:rPr lang="en-US" b="0" i="1" smtClean="0">
-                                      <a:latin typeface="Cambria Math" panose="02040503050406030204" pitchFamily="18" charset="0"/>
-                                    </a:rPr>
-                                  </m:ctrlPr>
-                                </m:fPr>
-                                <m:num>
-                                  <m:r>
-                                    <a:rPr lang="en-US" b="0" i="1" smtClean="0">
-                                      <a:latin typeface="Cambria Math"/>
-                                    </a:rPr>
-                                    <m:t>−</m:t>
-                                  </m:r>
-                                  <m:r>
-                                    <a:rPr lang="en-US" b="0" i="1" smtClean="0">
-                                      <a:latin typeface="Cambria Math"/>
-                                    </a:rPr>
-                                    <m:t>𝑥</m:t>
-                                  </m:r>
-                                </m:num>
-                                <m:den>
-                                  <m:r>
-                                    <a:rPr lang="en-US" b="0" i="1" smtClean="0">
-                                      <a:latin typeface="Cambria Math"/>
-                                    </a:rPr>
-                                    <m:t>2</m:t>
-                                  </m:r>
-                                </m:den>
-                              </m:f>
-                            </m:sup>
-                          </m:sSup>
-                        </m:num>
-                        <m:den>
-                          <m:r>
-                            <a:rPr lang="en-US" b="0" i="1" smtClean="0">
-                              <a:latin typeface="Cambria Math"/>
-                            </a:rPr>
-                            <m:t>𝑐</m:t>
-                          </m:r>
-                        </m:den>
-                      </m:f>
+                                <m:t>2</m:t>
+                              </m:r>
+                            </m:den>
+                          </m:f>
+                        </m:sup>
+                      </m:sSup>
                     </m:oMath>
                   </m:oMathPara>
                 </a14:m>
@@ -16681,10 +17595,10 @@
                       </m:func>
                       <m:r>
                         <a:rPr lang="en-US" i="1">
-                          <a:latin typeface="Cambria Math" panose="02040503050406030204" pitchFamily="18" charset="0"/>
+                          <a:latin typeface="Cambria Math"/>
                           <a:ea typeface="Cambria Math" panose="02040503050406030204" pitchFamily="18" charset="0"/>
                         </a:rPr>
-                        <m:t>≡</m:t>
+                        <m:t>∝</m:t>
                       </m:r>
                       <m:r>
                         <a:rPr lang="en-US" b="0" i="1" smtClean="0">
@@ -17721,7 +18635,7 @@
       </p:sp>
       <p:pic>
         <p:nvPicPr>
-          <p:cNvPr id="4" name="Picture 3"/>
+          <p:cNvPr id="7" name="Picture 6"/>
           <p:cNvPicPr>
             <a:picLocks noChangeAspect="1"/>
           </p:cNvPicPr>
@@ -17742,7 +18656,7 @@
         <p:spPr>
           <a:xfrm>
             <a:off x="0" y="0"/>
-            <a:ext cx="9144000" cy="6858000"/>
+            <a:ext cx="9143999" cy="6858000"/>
           </a:xfrm>
           <a:prstGeom prst="rect">
             <a:avLst/>
@@ -19001,7 +19915,7 @@
 </file>
 
 <file path=ppt/slides/slide8.xml><?xml version="1.0" encoding="utf-8"?>
-<p:sld xmlns:a="http://schemas.openxmlformats.org/drawingml/2006/main" xmlns:r="http://schemas.openxmlformats.org/officeDocument/2006/relationships" xmlns:p="http://schemas.openxmlformats.org/presentationml/2006/main">
+<p:sld xmlns:a="http://schemas.openxmlformats.org/drawingml/2006/main" xmlns:r="http://schemas.openxmlformats.org/officeDocument/2006/relationships" xmlns:p="http://schemas.openxmlformats.org/presentationml/2006/main" show="0">
   <p:cSld>
     <p:spTree>
       <p:nvGrpSpPr>
@@ -20326,6 +21240,14 @@
   <p:clrMapOvr>
     <a:masterClrMapping/>
   </p:clrMapOvr>
+  <mc:AlternateContent xmlns:mc="http://schemas.openxmlformats.org/markup-compatibility/2006" xmlns:p14="http://schemas.microsoft.com/office/powerpoint/2010/main">
+    <mc:Choice Requires="p14">
+      <p:transition spd="slow" p14:dur="2000"/>
+    </mc:Choice>
+    <mc:Fallback xmlns="">
+      <p:transition spd="slow"/>
+    </mc:Fallback>
+  </mc:AlternateContent>
   <p:timing>
     <p:tnLst>
       <p:par>
@@ -20337,7 +21259,7 @@
 </file>
 
 <file path=ppt/slides/slide9.xml><?xml version="1.0" encoding="utf-8"?>
-<p:sld xmlns:a="http://schemas.openxmlformats.org/drawingml/2006/main" xmlns:r="http://schemas.openxmlformats.org/officeDocument/2006/relationships" xmlns:p="http://schemas.openxmlformats.org/presentationml/2006/main">
+<p:sld xmlns:a="http://schemas.openxmlformats.org/drawingml/2006/main" xmlns:r="http://schemas.openxmlformats.org/officeDocument/2006/relationships" xmlns:p="http://schemas.openxmlformats.org/presentationml/2006/main" show="0">
   <p:cSld>
     <p:spTree>
       <p:nvGrpSpPr>
@@ -21159,6 +22081,14 @@
   <p:clrMapOvr>
     <a:masterClrMapping/>
   </p:clrMapOvr>
+  <mc:AlternateContent xmlns:mc="http://schemas.openxmlformats.org/markup-compatibility/2006" xmlns:p14="http://schemas.microsoft.com/office/powerpoint/2010/main">
+    <mc:Choice Requires="p14">
+      <p:transition spd="slow" p14:dur="2000"/>
+    </mc:Choice>
+    <mc:Fallback xmlns="">
+      <p:transition spd="slow"/>
+    </mc:Fallback>
+  </mc:AlternateContent>
   <p:timing>
     <p:tnLst>
       <p:par>

</xml_diff>